<commit_message>
latest windev vslive session updates
</commit_message>
<xml_diff>
--- a/2024/0430_VSLiveChicago/WindowsDev/VSLCH24_Building a Native App for Windows_AlvinAshcraft.pptx
+++ b/2024/0430_VSLiveChicago/WindowsDev/VSLCH24_Building a Native App for Windows_AlvinAshcraft.pptx
@@ -28,9 +28,9 @@
     <p:sldId id="287" r:id="rId16"/>
     <p:sldId id="288" r:id="rId17"/>
     <p:sldId id="289" r:id="rId18"/>
-    <p:sldId id="290" r:id="rId19"/>
-    <p:sldId id="291" r:id="rId20"/>
-    <p:sldId id="292" r:id="rId21"/>
+    <p:sldId id="292" r:id="rId19"/>
+    <p:sldId id="290" r:id="rId20"/>
+    <p:sldId id="291" r:id="rId21"/>
     <p:sldId id="293" r:id="rId22"/>
     <p:sldId id="294" r:id="rId23"/>
     <p:sldId id="295" r:id="rId24"/>
@@ -647,16 +647,16 @@
           <a:p>
             <a:r>
               <a:rPr lang="en-US" dirty="0"/>
-              <a:t>My name is Alvin Ashcraft, and this session is about choosing the best UI framework for your next Windows application.</a:t>
-            </a:r>
-          </a:p>
-          <a:p>
-            <a:endParaRPr lang="en-US" dirty="0"/>
-          </a:p>
-          <a:p>
-            <a:r>
-              <a:rPr lang="en-US" dirty="0"/>
-              <a:t>There are a slew of options out there, and we’ll be touching on many of them tonight, focusing primarily on the options from Microsoft.</a:t>
+              <a:t>My name is Alvin Ashcraft, and in this session, we’ll talk about about choosing the best UI framework for your next native Windows app.</a:t>
+            </a:r>
+          </a:p>
+          <a:p>
+            <a:endParaRPr lang="en-US" dirty="0"/>
+          </a:p>
+          <a:p>
+            <a:r>
+              <a:rPr lang="en-US" dirty="0"/>
+              <a:t>There are lots of options out there today, and we’ll be touching on many of them in this session, focusing primarily on the options from Microsoft.</a:t>
             </a:r>
           </a:p>
           <a:p>
@@ -755,7 +755,7 @@
           <a:p>
             <a:r>
               <a:rPr lang="en-US" dirty="0"/>
-              <a:t>The primary downside for many developers is the XAML learning curve. I love working with XAML, but it’s not everyone’s favorite UI language.</a:t>
+              <a:t>The primary downside for many developers considering WPF is the XAML learning curve. I love working with XAML, but it’s not everyone’s favorite way to build a UI.</a:t>
             </a:r>
           </a:p>
           <a:p>
@@ -790,7 +790,7 @@
             </a:pPr>
             <a:r>
               <a:rPr lang="en-US" dirty="0"/>
-              <a:t>The Windows theming and dark mode switching is still on the way. The current UI doesn’t look like Windows 10/11 out of the box yet. It still looks a bit pre-Windows 10, but that refresh is on the way. We’ll see how close to Fluent Design it looks when they’re done with that refresh later this year.</a:t>
+              <a:t>The Windows theming and dark mode switching is still on the way. The current UI doesn’t look like Windows 11 out of the box yet. It still looks a bit pre-Windows 8, but that refresh is on the way. We’ll see how close it looks to Fluent Design when they’re done with that refresh later this year.</a:t>
             </a:r>
           </a:p>
           <a:p>
@@ -919,7 +919,7 @@
             </a:pPr>
             <a:r>
               <a:rPr lang="en-US" dirty="0"/>
-              <a:t>Let’s look at the WPF project next.</a:t>
+              <a:t>Let’s look at the WPF sample app next.</a:t>
             </a:r>
           </a:p>
         </p:txBody>
@@ -983,16 +983,16 @@
           <a:p>
             <a:r>
               <a:rPr lang="en-US" dirty="0"/>
-              <a:t>Let’s talk UWP apps now…</a:t>
-            </a:r>
-          </a:p>
-          <a:p>
-            <a:endParaRPr lang="en-US" dirty="0"/>
-          </a:p>
-          <a:p>
-            <a:r>
-              <a:rPr lang="en-US" dirty="0"/>
-              <a:t>Thanks to Windows Phone, UWP apps are optimized for performance. They are small and memory-optimized with the .NET Native runtime. The latest WhatsApp app for Windows in the Microsoft Store was built on UWP, and it’s got great performance.</a:t>
+              <a:t>Let’s briefly talk about UWP apps next. We’ll touch on some advantages, but the drawbacks on the next slide should weigh heavily on your decision.</a:t>
+            </a:r>
+          </a:p>
+          <a:p>
+            <a:endParaRPr lang="en-US" dirty="0"/>
+          </a:p>
+          <a:p>
+            <a:r>
+              <a:rPr lang="en-US" dirty="0"/>
+              <a:t>Thanks to Windows Phone, UWP apps are optimized for performance. They are small and memory-optimized with the .NET Native runtime.</a:t>
             </a:r>
           </a:p>
           <a:p>
@@ -1010,16 +1010,16 @@
           <a:p>
             <a:r>
               <a:rPr lang="en-US" dirty="0"/>
-              <a:t>Visual Studio has a XAML designer for drag &amp; drop UI building, like WPF.</a:t>
-            </a:r>
-          </a:p>
-          <a:p>
-            <a:endParaRPr lang="en-US" dirty="0"/>
-          </a:p>
-          <a:p>
-            <a:r>
-              <a:rPr lang="en-US" dirty="0"/>
-              <a:t>These apps were built for pen and touch and provide dark mode support.</a:t>
+              <a:t>Like WPF, Visual Studio has a XAML designer for drag &amp; drop UI building.</a:t>
+            </a:r>
+          </a:p>
+          <a:p>
+            <a:endParaRPr lang="en-US" dirty="0"/>
+          </a:p>
+          <a:p>
+            <a:r>
+              <a:rPr lang="en-US" dirty="0"/>
+              <a:t>UWP apps were built for pen and touch and provide dark mode support.</a:t>
             </a:r>
           </a:p>
           <a:p>
@@ -1110,6 +1110,15 @@
           <a:p>
             <a:r>
               <a:rPr lang="en-US" dirty="0"/>
+              <a:t>&lt;10:00&gt;</a:t>
+            </a:r>
+          </a:p>
+          <a:p>
+            <a:endParaRPr lang="en-US" dirty="0"/>
+          </a:p>
+          <a:p>
+            <a:r>
+              <a:rPr lang="en-US" dirty="0"/>
               <a:t>The downside of building UWP apps.</a:t>
             </a:r>
           </a:p>
@@ -1137,7 +1146,7 @@
           <a:p>
             <a:r>
               <a:rPr lang="en-US" dirty="0"/>
-              <a:t>While .NET Native is small and fast, it’s also aging. With UWP, you don’t’ get access to modern .NET or language features. In fact, you can’t officially use any C# language features beyond C# 8 (and we’re up to C# 12 now in .NET 8 – it’s always the .NET version plus 4). It requires some work-arounds, and you’re better off just choosing another UI framework.</a:t>
+              <a:t>While .NET Native is small and fast, it’s also aging. With UWP, you don’t’ get access to modern .NET or language features. In fact, you can’t officially use any C# language features beyond C# 7 (and we’re up to C# 12 now in .NET 8 – it’s always the .NET version plus 4). It requires some work-arounds, and you’re better off just choosing another UI framework.</a:t>
             </a:r>
           </a:p>
           <a:p>
@@ -1155,16 +1164,16 @@
           <a:p>
             <a:r>
               <a:rPr lang="en-US" dirty="0"/>
-              <a:t>UWP relies on .NET Standard for shared libraries, like when you’re creating or consuming NuGet packages, and Microsoft has been moving away from that .NET Standard. Today, just using modern .NET is the standard feature set across platforms. That move leaves UWP behind. In fact, the Microsoft Authentication Libraries (MSAL) just announced that they are dropping support for Xamarin and UWP in their NuGet packages moving forward. I expect others will follow suit.</a:t>
-            </a:r>
-          </a:p>
-          <a:p>
-            <a:endParaRPr lang="en-US" dirty="0"/>
-          </a:p>
-          <a:p>
-            <a:r>
-              <a:rPr lang="en-US" dirty="0"/>
-              <a:t>Finally, UWP versions are tied to Windows SDK versions. We’ll see how WinUI separated itself from this dependency on Windows.</a:t>
+              <a:t>UWP relies on .NET Standard for shared libraries, like when you’re consuming NuGet packages, and Microsoft has been moving away from that .NET Standard. Today, just using modern .NET is the standard feature set across platforms. That move leaves UWP behind. In fact, the Microsoft Authentication Libraries (MSAL) just announced that they are dropping support for Xamarin and UWP in their NuGet packages moving forward. I expect others will follow suit.</a:t>
+            </a:r>
+          </a:p>
+          <a:p>
+            <a:endParaRPr lang="en-US" dirty="0"/>
+          </a:p>
+          <a:p>
+            <a:r>
+              <a:rPr lang="en-US" dirty="0"/>
+              <a:t>Finally, UWP versions are tied to Windows SDK versions. We’ll see how WinUI separated itself from this dependency on the Windows SDK.</a:t>
             </a:r>
           </a:p>
           <a:p>
@@ -1264,7 +1273,7 @@
           <a:p>
             <a:r>
               <a:rPr lang="en-US" dirty="0"/>
-              <a:t>You get the features and controls of UWP without being coupled to a specific version of the Windows SDK. The Windows App SDK updates multiple times a year. Some of the recent updates brought XAML Islands, Theming, Notifications, improved multi-window support with </a:t>
+              <a:t>You get the features and controls of UWP without being coupled to a specific version of the Windows SDK. The Windows App SDK updates multiple times a year. Some of the recent updates brought some XAML Islands support, Theming, Notifications, improved multi-window support with </a:t>
             </a:r>
             <a:r>
               <a:rPr lang="en-US" dirty="0" err="1"/>
@@ -1272,7 +1281,7 @@
             </a:r>
             <a:r>
               <a:rPr lang="en-US" dirty="0"/>
-              <a:t>, and media controls. Windows App SDK 1.5 brought the much-anticipated Maps control to WinUI. It was one of the top requested features. We’ll get to some other feature requests on the roadmap on the next slide.</a:t>
+              <a:t>, and media controls. The most recent Windows App SDK, version 1.5, brought the much-anticipated Maps control to WinUI. It was one of the top requested features. We’ll get to some other feature requests on the roadmap on the next slide.</a:t>
             </a:r>
           </a:p>
           <a:p>
@@ -1308,16 +1317,16 @@
           <a:p>
             <a:r>
               <a:rPr lang="en-US" dirty="0"/>
-              <a:t>You can also get even more free controls and components for WinUI with the Windows Community Toolkit and .NET Community Toolkit. You can read more about them in my WinUI 3 book.</a:t>
-            </a:r>
-          </a:p>
-          <a:p>
-            <a:endParaRPr lang="en-US" dirty="0"/>
-          </a:p>
-          <a:p>
-            <a:r>
-              <a:rPr lang="en-US" dirty="0"/>
-              <a:t>Finally, Microsoft is really positioning WinUI as the top choice for developers to build apps for Windows. You can see that commitment in their partnerships with Apple &amp; Adobe to bring high profile, first-class apps to Windows.</a:t>
+              <a:t>You can also get even more free controls and components for WinUI with the Windows Community Toolkit and .NET Community Toolkit. You can read more about leveraging them in my WinUI 3 book.</a:t>
+            </a:r>
+          </a:p>
+          <a:p>
+            <a:endParaRPr lang="en-US" dirty="0"/>
+          </a:p>
+          <a:p>
+            <a:r>
+              <a:rPr lang="en-US" dirty="0"/>
+              <a:t>Finally, Microsoft is really positioning WinUI as the top choice for developers to build the best apps for Windows. You can see that commitment in their partnerships with Apple &amp; Adobe to bring high profile, first-class apps to Windows.</a:t>
             </a:r>
           </a:p>
         </p:txBody>
@@ -1416,7 +1425,7 @@
           <a:p>
             <a:r>
               <a:rPr lang="en-US" dirty="0"/>
-              <a:t>Next, WinUI apps only support C# and C++. There’s no support for VB or F#. Like I mentioned with WPF, you could create a minimal UI project with only views, and reference a VB or F# project to access the view models and the rest of your code.</a:t>
+              <a:t>Next, WinUI apps only support C# and C++. There’s no support for VB or F#. Like I mentioned with WPF, you could create a minimal UI project with only views and reference a VB or F# project to access the view models and the rest of your code.</a:t>
             </a:r>
           </a:p>
           <a:p>
@@ -1576,7 +1585,7 @@
           <a:p>
             <a:r>
               <a:rPr lang="en-US" dirty="0"/>
-              <a:t>If you’ve built other XAML apps, picking up .NET MAUI is pretty simple. The layout, styling, and binding are all similar. Some controls have slightly different names. It supports MVVM for separate of concerns and data binding.</a:t>
+              <a:t>If you’ve built other XAML apps, picking up .NET MAUI is simple. The layout, styling, and binding are all similar. Some controls have slightly different names. It supports MVVM for separate of concerns and data binding.</a:t>
             </a:r>
           </a:p>
           <a:p>
@@ -1603,7 +1612,16 @@
           <a:p>
             <a:r>
               <a:rPr lang="en-US" dirty="0"/>
-              <a:t>There’s also a Blazor Hybrid app template for .NET MAUI. This allows you to build your UI with Razor components which get hosted inside a custom WebView control in the MAUI host app. We’ll also touch on building Blazor Hybrid apps for Windows later. You’ll see how you can take the Blazor Hybrid approach on desktop with WPF or WinForms WebView hosts.</a:t>
+              <a:t>There’s also a Blazor Hybrid app template for .NET MAUI. This allows you to build your UI with Razor components which get hosted inside a custom WebView control in the MAUI host app. There’s a session on hybrid apps in .NET MAUI later today in this room.</a:t>
+            </a:r>
+          </a:p>
+          <a:p>
+            <a:endParaRPr lang="en-US" dirty="0"/>
+          </a:p>
+          <a:p>
+            <a:r>
+              <a:rPr lang="en-US" dirty="0"/>
+              <a:t>We’ll also touch on building Blazor Hybrid apps for Windows later. You’ll see how you can take the Blazor Hybrid approach on desktop with WPF or WinForms WebView hosts.</a:t>
             </a:r>
           </a:p>
         </p:txBody>
@@ -1667,7 +1685,7 @@
           <a:p>
             <a:r>
               <a:rPr lang="en-US" dirty="0"/>
-              <a:t>Some MAUI drawbacks…</a:t>
+              <a:t>Some MAUI drawbacks.</a:t>
             </a:r>
           </a:p>
           <a:p>
@@ -1794,86 +1812,73 @@
           <a:p>
             <a:r>
               <a:rPr lang="en-US" dirty="0"/>
-              <a:t>Advantages of using a 3</a:t>
-            </a:r>
-            <a:r>
-              <a:rPr lang="en-US" baseline="30000" dirty="0"/>
-              <a:t>rd</a:t>
-            </a:r>
-            <a:r>
-              <a:rPr lang="en-US" dirty="0"/>
-              <a:t> party cross-platform solution like Uno Platform or Avalonia UI.</a:t>
-            </a:r>
-          </a:p>
-          <a:p>
-            <a:endParaRPr lang="en-US" dirty="0"/>
-          </a:p>
-          <a:p>
-            <a:r>
-              <a:rPr lang="en-US" dirty="0"/>
-              <a:t>You get all the MAUI platforms plus Linux!</a:t>
-            </a:r>
-          </a:p>
-          <a:p>
-            <a:endParaRPr lang="en-US" dirty="0"/>
-          </a:p>
-          <a:p>
-            <a:r>
-              <a:rPr lang="en-US" dirty="0"/>
-              <a:t>With Uno, you can even use </a:t>
-            </a:r>
-            <a:r>
-              <a:rPr lang="en-US" dirty="0" err="1"/>
-              <a:t>Skia.WPF</a:t>
-            </a:r>
-            <a:r>
-              <a:rPr lang="en-US" dirty="0"/>
-              <a:t> to run on older platforms like Windows 7. If you’re only targeting Windows 10 or later, you’ll want to choose the WinUI option.</a:t>
-            </a:r>
-          </a:p>
-          <a:p>
-            <a:endParaRPr lang="en-US" dirty="0"/>
-          </a:p>
-          <a:p>
-            <a:r>
-              <a:rPr lang="en-US" dirty="0"/>
-              <a:t>WinUI Uno project code is nearly identical to WinUI code. I created an Uno app for my book by creating an Uno Platform project with their new project wizard and copy/pasting my WinUI project code (XAML and C#). It just works for most basic apps. Like other cross-platform code, it gets more complicated with device-specific functionality.</a:t>
-            </a:r>
-          </a:p>
-          <a:p>
-            <a:endParaRPr lang="en-US" dirty="0"/>
-          </a:p>
-          <a:p>
-            <a:r>
-              <a:rPr lang="en-US" dirty="0"/>
-              <a:t>You can use C# Markup or XAML to build your UI. The new project wizard will ask you which you want to use.</a:t>
-            </a:r>
-          </a:p>
-          <a:p>
-            <a:endParaRPr lang="en-US" dirty="0"/>
-          </a:p>
-          <a:p>
-            <a:r>
-              <a:rPr lang="en-US" dirty="0"/>
-              <a:t>Uno has a Figma plugin so your design team can design your app screens and generate your Uno pages.</a:t>
-            </a:r>
-          </a:p>
-          <a:p>
-            <a:endParaRPr lang="en-US" dirty="0"/>
-          </a:p>
-          <a:p>
-            <a:r>
-              <a:rPr lang="en-US" dirty="0"/>
-              <a:t>Uno can create apps with Microsoft Fluent, Google Material or Apple’s Cupertino look and feel.</a:t>
-            </a:r>
-          </a:p>
-          <a:p>
-            <a:endParaRPr lang="en-US" dirty="0"/>
-          </a:p>
-          <a:p>
-            <a:r>
-              <a:rPr lang="en-US" dirty="0"/>
-              <a:t>Uno has plugins for Visual Studio, VS Code or JetBrains Rider. So, you can build apps with your favorite editor or IDE.</a:t>
+              <a:t>Blazor Hybrid on Windows (or mobile)</a:t>
+            </a:r>
+          </a:p>
+          <a:p>
+            <a:endParaRPr lang="en-US" dirty="0"/>
+          </a:p>
+          <a:p>
+            <a:r>
+              <a:rPr lang="en-US" dirty="0"/>
+              <a:t>Pros</a:t>
+            </a:r>
+          </a:p>
+          <a:p>
+            <a:r>
+              <a:rPr lang="en-US" dirty="0"/>
+              <a:t>  - No XAML learning curve. If you know Razor pages and C#, you’re ready to go!</a:t>
+            </a:r>
+          </a:p>
+          <a:p>
+            <a:r>
+              <a:rPr lang="en-US" dirty="0"/>
+              <a:t>  - Again, web developers will love working with CSS instead of XAML styles.</a:t>
+            </a:r>
+          </a:p>
+          <a:p>
+            <a:r>
+              <a:rPr lang="en-US" dirty="0"/>
+              <a:t>  - You’re building web and using .NET. Your app can consume any other modern .NET libraries.</a:t>
+            </a:r>
+          </a:p>
+          <a:p>
+            <a:r>
+              <a:rPr lang="en-US" dirty="0"/>
+              <a:t>  - You can build your hybrid app inside WPF or WinForms, which makes it easy to integrate with your existing apps on those platforms.</a:t>
+            </a:r>
+          </a:p>
+          <a:p>
+            <a:endParaRPr lang="en-US" dirty="0"/>
+          </a:p>
+          <a:p>
+            <a:endParaRPr lang="en-US" dirty="0"/>
+          </a:p>
+          <a:p>
+            <a:r>
+              <a:rPr lang="en-US" dirty="0"/>
+              <a:t>Cons</a:t>
+            </a:r>
+          </a:p>
+          <a:p>
+            <a:r>
+              <a:rPr lang="en-US" dirty="0"/>
+              <a:t>  - Interop has its costs…. Performance, maybe bugs in the interop layer?, issues with accessibility, keyboarding, you’re dealing with support across desktop and web products.</a:t>
+            </a:r>
+          </a:p>
+          <a:p>
+            <a:r>
+              <a:rPr lang="en-US" dirty="0"/>
+              <a:t>  - It feels like a web app… it’s got that bouncy feeling when you drag things around.</a:t>
+            </a:r>
+          </a:p>
+          <a:p>
+            <a:endParaRPr lang="en-US" dirty="0"/>
+          </a:p>
+          <a:p>
+            <a:r>
+              <a:rPr lang="en-US" dirty="0"/>
+              <a:t>Let’s take a very quick lap around a Blazor Hybrid app.</a:t>
             </a:r>
           </a:p>
         </p:txBody>
@@ -1881,7 +1886,7 @@
     </p:spTree>
     <p:extLst>
       <p:ext uri="{BB962C8B-B14F-4D97-AF65-F5344CB8AC3E}">
-        <p14:creationId xmlns:p14="http://schemas.microsoft.com/office/powerpoint/2010/main" val="364038437"/>
+        <p14:creationId xmlns:p14="http://schemas.microsoft.com/office/powerpoint/2010/main" val="3758400909"/>
       </p:ext>
     </p:extLst>
   </p:cSld>
@@ -1937,25 +1942,7 @@
           <a:p>
             <a:r>
               <a:rPr lang="en-US" dirty="0"/>
-              <a:t>Some of the drawbacks of platforms like Uno…</a:t>
-            </a:r>
-          </a:p>
-          <a:p>
-            <a:endParaRPr lang="en-US" dirty="0"/>
-          </a:p>
-          <a:p>
-            <a:r>
-              <a:rPr lang="en-US" dirty="0"/>
-              <a:t>No official support for VB, F# or C++.</a:t>
-            </a:r>
-          </a:p>
-          <a:p>
-            <a:endParaRPr lang="en-US" dirty="0"/>
-          </a:p>
-          <a:p>
-            <a:r>
-              <a:rPr lang="en-US" dirty="0"/>
-              <a:t>It’s a 3</a:t>
+              <a:t>Advantages of using a 3</a:t>
             </a:r>
             <a:r>
               <a:rPr lang="en-US" baseline="30000" dirty="0"/>
@@ -1963,60 +1950,78 @@
             </a:r>
             <a:r>
               <a:rPr lang="en-US" dirty="0"/>
-              <a:t> party solution. Some companies that use Microsoft solutions can be hesitant to work with 3</a:t>
-            </a:r>
-            <a:r>
-              <a:rPr lang="en-US" baseline="30000" dirty="0"/>
-              <a:t>rd</a:t>
-            </a:r>
-            <a:r>
-              <a:rPr lang="en-US" dirty="0"/>
-              <a:t> party platforms.</a:t>
-            </a:r>
-          </a:p>
-          <a:p>
-            <a:endParaRPr lang="en-US" dirty="0"/>
-          </a:p>
-          <a:p>
-            <a:r>
-              <a:rPr lang="en-US" dirty="0"/>
-              <a:t>There are paid options for advanced support. Avalonia also has licensing terms for app deployment.</a:t>
-            </a:r>
-          </a:p>
-          <a:p>
-            <a:endParaRPr lang="en-US" dirty="0"/>
-          </a:p>
-          <a:p>
-            <a:r>
-              <a:rPr lang="en-US" dirty="0"/>
-              <a:t>Like with WinUI and .NET MAUI, there’s no XAML designer.</a:t>
-            </a:r>
-          </a:p>
-          <a:p>
-            <a:endParaRPr lang="en-US" dirty="0"/>
-          </a:p>
-          <a:p>
-            <a:r>
-              <a:rPr lang="en-US" dirty="0"/>
-              <a:t>You have the platform-specific code issue we discussed with MAUI app development.</a:t>
-            </a:r>
-          </a:p>
-          <a:p>
-            <a:endParaRPr lang="en-US" dirty="0"/>
-          </a:p>
-          <a:p>
-            <a:r>
-              <a:rPr lang="en-US" dirty="0"/>
-              <a:t>And there are similar cross-platform vs native performance concerns we discussed with MAUI.</a:t>
-            </a:r>
-          </a:p>
-          <a:p>
-            <a:endParaRPr lang="en-US" dirty="0"/>
-          </a:p>
-          <a:p>
-            <a:r>
-              <a:rPr lang="en-US" dirty="0"/>
-              <a:t>Let’s take a quick look at the Uno version of our WinUI shopping list app. If there’s time, we’ll bring up the new project wizard to look at the options there.</a:t>
+              <a:t> party cross-platform solution like Uno Platform or Avalonia UI.</a:t>
+            </a:r>
+          </a:p>
+          <a:p>
+            <a:endParaRPr lang="en-US" dirty="0"/>
+          </a:p>
+          <a:p>
+            <a:r>
+              <a:rPr lang="en-US" dirty="0"/>
+              <a:t>You get all the MAUI platforms plus Linux!</a:t>
+            </a:r>
+          </a:p>
+          <a:p>
+            <a:endParaRPr lang="en-US" dirty="0"/>
+          </a:p>
+          <a:p>
+            <a:r>
+              <a:rPr lang="en-US" dirty="0"/>
+              <a:t>With Uno, you can even use </a:t>
+            </a:r>
+            <a:r>
+              <a:rPr lang="en-US" dirty="0" err="1"/>
+              <a:t>Skia.WPF</a:t>
+            </a:r>
+            <a:r>
+              <a:rPr lang="en-US" dirty="0"/>
+              <a:t> to run on older platforms like Windows 7. If you’re only targeting Windows 10 or later, you’ll want to choose the WinUI option.</a:t>
+            </a:r>
+          </a:p>
+          <a:p>
+            <a:endParaRPr lang="en-US" dirty="0"/>
+          </a:p>
+          <a:p>
+            <a:r>
+              <a:rPr lang="en-US" dirty="0"/>
+              <a:t>WinUI Uno project code is nearly identical to WinUI code. I created an Uno app for my book by creating an Uno Platform project with their new project wizard and copy/pasting my WinUI project code (XAML and C#). It just works for most basic apps. Like other cross-platform code, it gets more complicated with device-specific functionality.</a:t>
+            </a:r>
+          </a:p>
+          <a:p>
+            <a:endParaRPr lang="en-US" dirty="0"/>
+          </a:p>
+          <a:p>
+            <a:r>
+              <a:rPr lang="en-US" dirty="0"/>
+              <a:t>You can use C# Markup or XAML to build your UI. The new project wizard will ask you which you want to use.</a:t>
+            </a:r>
+          </a:p>
+          <a:p>
+            <a:endParaRPr lang="en-US" dirty="0"/>
+          </a:p>
+          <a:p>
+            <a:r>
+              <a:rPr lang="en-US" dirty="0"/>
+              <a:t>Uno has a Figma plugin so your design team can design your app screens and generate your Uno pages.</a:t>
+            </a:r>
+          </a:p>
+          <a:p>
+            <a:endParaRPr lang="en-US" dirty="0"/>
+          </a:p>
+          <a:p>
+            <a:r>
+              <a:rPr lang="en-US" dirty="0"/>
+              <a:t>Uno can create apps with Microsoft Fluent, Google Material or Apple’s Cupertino look and feel.</a:t>
+            </a:r>
+          </a:p>
+          <a:p>
+            <a:endParaRPr lang="en-US" dirty="0"/>
+          </a:p>
+          <a:p>
+            <a:r>
+              <a:rPr lang="en-US" dirty="0"/>
+              <a:t>Uno has plugins for Visual Studio, VS Code or JetBrains Rider. So, you can build apps with your favorite editor or IDE.</a:t>
             </a:r>
           </a:p>
         </p:txBody>
@@ -2024,7 +2029,7 @@
     </p:spTree>
     <p:extLst>
       <p:ext uri="{BB962C8B-B14F-4D97-AF65-F5344CB8AC3E}">
-        <p14:creationId xmlns:p14="http://schemas.microsoft.com/office/powerpoint/2010/main" val="4204330024"/>
+        <p14:creationId xmlns:p14="http://schemas.microsoft.com/office/powerpoint/2010/main" val="364038437"/>
       </p:ext>
     </p:extLst>
   </p:cSld>
@@ -2080,73 +2085,95 @@
           <a:p>
             <a:r>
               <a:rPr lang="en-US" dirty="0"/>
-              <a:t>Blazor Hybrid on Windows (or mobile)</a:t>
-            </a:r>
-          </a:p>
-          <a:p>
-            <a:endParaRPr lang="en-US" dirty="0"/>
-          </a:p>
-          <a:p>
-            <a:r>
-              <a:rPr lang="en-US" dirty="0"/>
-              <a:t>Pros</a:t>
-            </a:r>
-          </a:p>
-          <a:p>
-            <a:r>
-              <a:rPr lang="en-US" dirty="0"/>
-              <a:t>  - No XAML learning curve. If you know Razor pages and C#, you’re ready to go!</a:t>
-            </a:r>
-          </a:p>
-          <a:p>
-            <a:r>
-              <a:rPr lang="en-US" dirty="0"/>
-              <a:t>  - Again, web developers will love working with CSS instead of XAML styles.</a:t>
-            </a:r>
-          </a:p>
-          <a:p>
-            <a:r>
-              <a:rPr lang="en-US" dirty="0"/>
-              <a:t>  - You’re building web and using .NET. Your app can consume any other modern .NET libraries.</a:t>
-            </a:r>
-          </a:p>
-          <a:p>
-            <a:r>
-              <a:rPr lang="en-US" dirty="0"/>
-              <a:t>  - You can build your hybrid app inside WPF or WinForms, which makes it easy to integrate with your existing apps on those platforms.</a:t>
-            </a:r>
-          </a:p>
-          <a:p>
-            <a:endParaRPr lang="en-US" dirty="0"/>
-          </a:p>
-          <a:p>
-            <a:endParaRPr lang="en-US" dirty="0"/>
-          </a:p>
-          <a:p>
-            <a:r>
-              <a:rPr lang="en-US" dirty="0"/>
-              <a:t>Cons</a:t>
-            </a:r>
-          </a:p>
-          <a:p>
-            <a:r>
-              <a:rPr lang="en-US" dirty="0"/>
-              <a:t>  - Interop has its costs…. Performance, maybe bugs in the interop layer?, issues with accessibility, keyboarding, you’re dealing with support across desktop and web products.</a:t>
-            </a:r>
-          </a:p>
-          <a:p>
-            <a:r>
-              <a:rPr lang="en-US" dirty="0"/>
-              <a:t>  - It feels like a web app… it’s got that bouncy feeling when you drag things around.</a:t>
-            </a:r>
-          </a:p>
-          <a:p>
-            <a:endParaRPr lang="en-US" dirty="0"/>
-          </a:p>
-          <a:p>
-            <a:r>
-              <a:rPr lang="en-US" dirty="0"/>
-              <a:t>Let’s take a very quick lap around a Blazor Hybrid app.</a:t>
+              <a:t>Some of the drawbacks of platforms like Uno…</a:t>
+            </a:r>
+          </a:p>
+          <a:p>
+            <a:endParaRPr lang="en-US" dirty="0"/>
+          </a:p>
+          <a:p>
+            <a:r>
+              <a:rPr lang="en-US" dirty="0"/>
+              <a:t>No official support for VB, F# or C++.</a:t>
+            </a:r>
+          </a:p>
+          <a:p>
+            <a:endParaRPr lang="en-US" dirty="0"/>
+          </a:p>
+          <a:p>
+            <a:r>
+              <a:rPr lang="en-US" dirty="0"/>
+              <a:t>It’s a 3</a:t>
+            </a:r>
+            <a:r>
+              <a:rPr lang="en-US" baseline="30000" dirty="0"/>
+              <a:t>rd</a:t>
+            </a:r>
+            <a:r>
+              <a:rPr lang="en-US" dirty="0"/>
+              <a:t> party solution. Some companies that use Microsoft solutions can be hesitant to work with 3</a:t>
+            </a:r>
+            <a:r>
+              <a:rPr lang="en-US" baseline="30000" dirty="0"/>
+              <a:t>rd</a:t>
+            </a:r>
+            <a:r>
+              <a:rPr lang="en-US" dirty="0"/>
+              <a:t> party platforms.</a:t>
+            </a:r>
+          </a:p>
+          <a:p>
+            <a:endParaRPr lang="en-US" dirty="0"/>
+          </a:p>
+          <a:p>
+            <a:r>
+              <a:rPr lang="en-US" dirty="0"/>
+              <a:t>There are paid options for advanced support. Avalonia also has licensing terms for app deployment.</a:t>
+            </a:r>
+          </a:p>
+          <a:p>
+            <a:endParaRPr lang="en-US" dirty="0"/>
+          </a:p>
+          <a:p>
+            <a:r>
+              <a:rPr lang="en-US" dirty="0"/>
+              <a:t>Like with WinUI and .NET MAUI, there’s no XAML designer.</a:t>
+            </a:r>
+          </a:p>
+          <a:p>
+            <a:endParaRPr lang="en-US" dirty="0"/>
+          </a:p>
+          <a:p>
+            <a:r>
+              <a:rPr lang="en-US" dirty="0"/>
+              <a:t>You have the platform-specific code issue we discussed with MAUI app development.</a:t>
+            </a:r>
+          </a:p>
+          <a:p>
+            <a:endParaRPr lang="en-US" dirty="0"/>
+          </a:p>
+          <a:p>
+            <a:r>
+              <a:rPr lang="en-US" dirty="0"/>
+              <a:t>And there are similar cross-platform vs native performance concerns we discussed with MAUI.</a:t>
+            </a:r>
+          </a:p>
+          <a:p>
+            <a:endParaRPr lang="en-US" dirty="0"/>
+          </a:p>
+          <a:p>
+            <a:r>
+              <a:rPr lang="en-US" dirty="0"/>
+              <a:t>Let’s take a quick look at the Uno version of our WinUI shopping list app.</a:t>
+            </a:r>
+          </a:p>
+          <a:p>
+            <a:endParaRPr lang="en-US" dirty="0"/>
+          </a:p>
+          <a:p>
+            <a:r>
+              <a:rPr lang="en-US" dirty="0"/>
+              <a:t>If there’s time, we’ll bring up the new project wizard to look at the options there.</a:t>
             </a:r>
           </a:p>
         </p:txBody>
@@ -2154,7 +2181,7 @@
     </p:spTree>
     <p:extLst>
       <p:ext uri="{BB962C8B-B14F-4D97-AF65-F5344CB8AC3E}">
-        <p14:creationId xmlns:p14="http://schemas.microsoft.com/office/powerpoint/2010/main" val="3758400909"/>
+        <p14:creationId xmlns:p14="http://schemas.microsoft.com/office/powerpoint/2010/main" val="4204330024"/>
       </p:ext>
     </p:extLst>
   </p:cSld>
@@ -2227,7 +2254,7 @@
             </a:pPr>
             <a:r>
               <a:rPr lang="en-US" dirty="0"/>
-              <a:t>Make sure you do your session surveys this week. </a:t>
+              <a:t>Surveys! Make sure you do your session surveys this week. </a:t>
             </a:r>
             <a:r>
               <a:rPr lang="en-US" dirty="0" err="1"/>
@@ -2356,42 +2383,43 @@
           <a:p>
             <a:r>
               <a:rPr lang="en-US" dirty="0"/>
-              <a:t>Do you need </a:t>
-            </a:r>
-            <a:r>
-              <a:rPr lang="en-US" dirty="0" err="1"/>
-              <a:t>xplat</a:t>
-            </a:r>
-            <a:r>
-              <a:rPr lang="en-US" dirty="0"/>
-              <a:t>? Or do you think you will in the future?</a:t>
-            </a:r>
-          </a:p>
-          <a:p>
-            <a:r>
-              <a:rPr lang="en-US" dirty="0"/>
-              <a:t>Are you porting an existing solution?</a:t>
-            </a:r>
-          </a:p>
-          <a:p>
-            <a:r>
-              <a:rPr lang="en-US" dirty="0"/>
-              <a:t>How long do you expect to support your app?</a:t>
-            </a:r>
-          </a:p>
-          <a:p>
-            <a:r>
-              <a:rPr lang="en-US" dirty="0"/>
-              <a:t>Do the current features of each platform meet your needs? Are missing features even on the roadmap?</a:t>
-            </a:r>
-          </a:p>
-          <a:p>
-            <a:endParaRPr lang="en-US" dirty="0"/>
-          </a:p>
-          <a:p>
-            <a:r>
-              <a:rPr lang="en-US" dirty="0"/>
-              <a:t>What does Microsoft recommend? Well, if WinUI and Windows App SDK has the features you need, you should choose that. It’s the hero framework moving forward. If it doesn’t have what you need, look at WPF. It’s still getting new features and is not going anywhere. Absolutely don’t want to touch XAML and love .NET? You can use C# Markup with Uno or MAUI (and get cross-platform options) or go with the tried-and-true WinForms option.</a:t>
+              <a:t>Do you need cross-platform? Or do you think you will in the future?</a:t>
+            </a:r>
+          </a:p>
+          <a:p>
+            <a:r>
+              <a:rPr lang="en-US" dirty="0"/>
+              <a:t>Are you porting an existing solution? Unless you’re on Xamarin or UWP, there’s no reason you NEED to change your selected framework.</a:t>
+            </a:r>
+          </a:p>
+          <a:p>
+            <a:r>
+              <a:rPr lang="en-US" dirty="0"/>
+              <a:t>How long do you expect to support your app? If you’re in it for the long haul, make sure you’re using a framework that can support upgrading with .NET long-term support versions every two years.</a:t>
+            </a:r>
+          </a:p>
+          <a:p>
+            <a:r>
+              <a:rPr lang="en-US" dirty="0"/>
+              <a:t>Do the current features of each platform meet your needs? Are there missing features on the product roadmap?</a:t>
+            </a:r>
+          </a:p>
+          <a:p>
+            <a:endParaRPr lang="en-US" dirty="0"/>
+          </a:p>
+          <a:p>
+            <a:r>
+              <a:rPr lang="en-US" dirty="0"/>
+              <a:t>What does Microsoft recommend? Well, if WinUI and Windows App SDK has the features you need, you should choose that. From the Windows team’s perspective, it’s the hero framework moving forward. If it doesn’t have what you need, look at WPF. WPF is also great for building complex, enterprise apps. It’s still getting new features and is not going anywhere.</a:t>
+            </a:r>
+          </a:p>
+          <a:p>
+            <a:endParaRPr lang="en-US" dirty="0"/>
+          </a:p>
+          <a:p>
+            <a:r>
+              <a:rPr lang="en-US" dirty="0"/>
+              <a:t>Absolutely don’t want to touch XAML and love .NET? You can use C# Markup with Uno or MAUI for cross-platform options, or you can stay native to Windows go with the tried-and-true WinForms option.</a:t>
             </a:r>
           </a:p>
         </p:txBody>
@@ -2464,7 +2492,19 @@
           <a:p>
             <a:r>
               <a:rPr lang="en-US" dirty="0"/>
-              <a:t>You can get this slide deck on my GitHub “speaking” repo, along with a larger list of links and the two Visual Studio solutions I used today.</a:t>
+              <a:t>You can get this slide deck on my GitHub “speaking” repo (</a:t>
+            </a:r>
+            <a:r>
+              <a:rPr lang="en-US" dirty="0" err="1"/>
+              <a:t>alvinashcraft</a:t>
+            </a:r>
+            <a:r>
+              <a:rPr lang="en-US"/>
+              <a:t>/speaking), </a:t>
+            </a:r>
+            <a:r>
+              <a:rPr lang="en-US" dirty="0"/>
+              <a:t>along with a larger list of links and the two Visual Studio solutions I used today.</a:t>
             </a:r>
           </a:p>
           <a:p>
@@ -2689,76 +2729,58 @@
           <a:p>
             <a:r>
               <a:rPr lang="en-US" dirty="0"/>
-              <a:t>A little background about me…</a:t>
-            </a:r>
-          </a:p>
-          <a:p>
-            <a:endParaRPr lang="en-US" dirty="0"/>
-          </a:p>
-          <a:p>
-            <a:r>
-              <a:rPr lang="en-US" dirty="0"/>
-              <a:t>For those who don’t know me, I’ve been in the software industry since 1995, with most of that time (over 25) years spent as a developer and architect using various Microsoft technologies.</a:t>
-            </a:r>
-          </a:p>
-          <a:p>
-            <a:endParaRPr lang="en-US" dirty="0"/>
-          </a:p>
-          <a:p>
-            <a:r>
-              <a:rPr lang="en-US" dirty="0"/>
-              <a:t>Some of you may also be familiar with my blog, the Morning Dew, where I’ve been posting daily links for .NET developers since 2007.</a:t>
-            </a:r>
-          </a:p>
-          <a:p>
-            <a:endParaRPr lang="en-US" dirty="0"/>
-          </a:p>
-          <a:p>
-            <a:r>
-              <a:rPr lang="en-US" dirty="0"/>
-              <a:t>I also have three books from </a:t>
-            </a:r>
-            <a:r>
-              <a:rPr lang="en-US" dirty="0" err="1"/>
-              <a:t>Packt</a:t>
-            </a:r>
-            <a:r>
-              <a:rPr lang="en-US" dirty="0"/>
-              <a:t> Publishing. You can check those out on </a:t>
-            </a:r>
-            <a:r>
-              <a:rPr lang="en-US" dirty="0" err="1"/>
-              <a:t>Packt’s</a:t>
-            </a:r>
-            <a:r>
-              <a:rPr lang="en-US" dirty="0"/>
-              <a:t> website or on Amazon. Just search for my name.</a:t>
-            </a:r>
-          </a:p>
-          <a:p>
-            <a:endParaRPr lang="en-US" dirty="0"/>
-          </a:p>
-          <a:p>
-            <a:r>
-              <a:rPr lang="en-US" dirty="0"/>
-              <a:t>Writing those books led me to pivot my career to technical writing. I joined Microsoft two years ago as a content developer. I write documentation, training modules, and code samples on Microsoft Learn. I work on the Windows developer docs team, helping to maintain the docs for client apps and APIs. I have another talk I give about my work as a content developer and how anyone can contribute to content on Learn through GitHub issues and PRs.</a:t>
-            </a:r>
-          </a:p>
-          <a:p>
-            <a:endParaRPr lang="en-US" dirty="0"/>
-          </a:p>
-          <a:p>
-            <a:r>
-              <a:rPr lang="en-US" dirty="0"/>
-              <a:t>Finally, I’m one of the founding organizers of the </a:t>
-            </a:r>
-            <a:r>
-              <a:rPr lang="en-US" dirty="0" err="1"/>
-              <a:t>TechBash</a:t>
-            </a:r>
-            <a:r>
-              <a:rPr lang="en-US" dirty="0"/>
-              <a:t> developer conference. We’ve been running the event in the Poconos since 2016, and…</a:t>
+              <a:t>A little bit about me…</a:t>
+            </a:r>
+          </a:p>
+          <a:p>
+            <a:endParaRPr lang="en-US" dirty="0"/>
+          </a:p>
+          <a:p>
+            <a:r>
+              <a:rPr lang="en-US" dirty="0"/>
+              <a:t>For those who don’t know me, I’ve been working in the software industry since 1995, with most of that time (over 25) years spent as a developer and architect using various Microsoft technologies.</a:t>
+            </a:r>
+          </a:p>
+          <a:p>
+            <a:endParaRPr lang="en-US" dirty="0"/>
+          </a:p>
+          <a:p>
+            <a:r>
+              <a:rPr lang="en-US" dirty="0"/>
+              <a:t>Some of you may also be familiar with my blog, the Morning Dew, where I’ve been posting daily links for .NET developers for 17 years.</a:t>
+            </a:r>
+          </a:p>
+          <a:p>
+            <a:endParaRPr lang="en-US" dirty="0"/>
+          </a:p>
+          <a:p>
+            <a:r>
+              <a:rPr lang="en-US" dirty="0"/>
+              <a:t>I’ve also written three books in the last four years, two editions of Learn WinUI 3 and a book on parallel programming with .NET. You can find them all on Amazon. Just search for my name.</a:t>
+            </a:r>
+          </a:p>
+          <a:p>
+            <a:endParaRPr lang="en-US" dirty="0"/>
+          </a:p>
+          <a:p>
+            <a:r>
+              <a:rPr lang="en-US" dirty="0"/>
+              <a:t>Writing those books led me to a full-time career in writing. I joined Microsoft two years ago as a content developer. I write documentation, training modules, and code samples on Microsoft Learn, working on the Windows developer docs team. There, I help write and maintain the docs for Windows client apps and APIs.</a:t>
+            </a:r>
+          </a:p>
+          <a:p>
+            <a:r>
+              <a:rPr lang="en-US" dirty="0"/>
+              <a:t>	I have another session after lunch about my work as a content developer and how anyone can contribute to the open-source docs on Learn with GitHub Issues and PRs.</a:t>
+            </a:r>
+          </a:p>
+          <a:p>
+            <a:endParaRPr lang="en-US" dirty="0"/>
+          </a:p>
+          <a:p>
+            <a:r>
+              <a:rPr lang="en-US" dirty="0"/>
+              <a:t>And… in my spare time, I’m also a conference organizer.</a:t>
             </a:r>
           </a:p>
         </p:txBody>
@@ -2831,25 +2853,25 @@
           <a:p>
             <a:r>
               <a:rPr lang="en-US" dirty="0"/>
-              <a:t>We’ll start with a brief review of the history of Windows development since the introduction of .NET in the early 2000s.</a:t>
-            </a:r>
-          </a:p>
-          <a:p>
-            <a:endParaRPr lang="en-US" dirty="0"/>
-          </a:p>
-          <a:p>
-            <a:r>
-              <a:rPr lang="en-US" dirty="0"/>
-              <a:t>Then we’ll review some reason why you may or may not decide to choose each of these UI frameworks, followed by a look at some code for each of them.</a:t>
-            </a:r>
-          </a:p>
-          <a:p>
-            <a:endParaRPr lang="en-US" dirty="0"/>
-          </a:p>
-          <a:p>
-            <a:r>
-              <a:rPr lang="en-US" dirty="0"/>
-              <a:t>I created a sample app using each framework. It’s a very basic shopping list app that loads some sample data. Each app shares the same code to load the sample data, and you can add more items, mark them as purchased or remove them from your list. We’ll see the similarities and difference and you’ll see that I’m not the best at UI design, no matter which framework I use.</a:t>
+              <a:t>We’ll start with a brief review of Windows development’s evolution since the introduction of .NET Framework.</a:t>
+            </a:r>
+          </a:p>
+          <a:p>
+            <a:endParaRPr lang="en-US" dirty="0"/>
+          </a:p>
+          <a:p>
+            <a:r>
+              <a:rPr lang="en-US" dirty="0"/>
+              <a:t>Then we’ll review some reasons why you might decide to choose each of these UI frameworks, followed by a look at some code for each of them.</a:t>
+            </a:r>
+          </a:p>
+          <a:p>
+            <a:endParaRPr lang="en-US" dirty="0"/>
+          </a:p>
+          <a:p>
+            <a:r>
+              <a:rPr lang="en-US" dirty="0"/>
+              <a:t>I created a sample app using each framework. It’s a very basic shopping list app that loads some sample data. Each app shares the same code to generate the sample data. You can add more items, mark them as purchased or remove them from your list. We’ll see the similarities and differences, and you’ll see that I’m probably not cut out to be a UI designer, no matter which framework I use.</a:t>
             </a:r>
           </a:p>
           <a:p>
@@ -2867,7 +2889,7 @@
           <a:p>
             <a:r>
               <a:rPr lang="en-US" dirty="0"/>
-              <a:t>And we’ll review some online resources you can keep handy, and hopefully we’ll have some time for Q&amp;A. But feel free to ask questions as we go. It’s usually best to address any questions while they’re in context, and there’s a good chance that you’re not the only one with that questions. If I don’t see questions in chat, please interrupt me any time.</a:t>
+              <a:t>And we’ll review some online resources you can keep handy, and we’ll have some time for Q&amp;A. But feel free to ask questions as we go.</a:t>
             </a:r>
           </a:p>
           <a:p>
@@ -2946,43 +2968,43 @@
           <a:p>
             <a:r>
               <a:rPr lang="en-US" dirty="0"/>
-              <a:t>WinForms has been there for every step of the way. Even before WinForms in .NET Microsoft has had a forms designer for Windows apps since 1991 when Bill Gates demoed the VB form designer.</a:t>
-            </a:r>
-          </a:p>
-          <a:p>
-            <a:endParaRPr lang="en-US" dirty="0"/>
-          </a:p>
-          <a:p>
-            <a:r>
-              <a:rPr lang="en-US" dirty="0"/>
-              <a:t>Windows Presentation Foundation (or WPF) was introduced around the same time as Windows Vista in 2006 and was the first XAML-based UI framework from Microsoft, followed by everyone’s favorite web development framework, Silverlight, in 2007. WPF became a big deal for enterprise developers, and quickly overtook WinForms as the de-facto choice for businesses building Windows apps.</a:t>
-            </a:r>
-          </a:p>
-          <a:p>
-            <a:endParaRPr lang="en-US" dirty="0"/>
-          </a:p>
-          <a:p>
-            <a:r>
-              <a:rPr lang="en-US" dirty="0"/>
-              <a:t>We’ll skim over the Windows 8 XAML apps that debuted in 2012 and talk about UWP apps. They were introduced in 2015 with Windows 10, and UWP apps gave developers a way to target Windows on desktops, phones, HoloLens, and Xbox with a single project. They had some success with ISVs building consumer apps, but never found a place in the enterprise. The constraints of the other platforms, held back the Windows 10 desktop capabilities. We’ll talk more about those things later.</a:t>
-            </a:r>
-          </a:p>
-          <a:p>
-            <a:endParaRPr lang="en-US" dirty="0"/>
-          </a:p>
-          <a:p>
-            <a:r>
-              <a:rPr lang="en-US" dirty="0"/>
-              <a:t>2021 gave use two new options for Windows apps, WinUI 3 (and the Windows App SDK) and Blazor Hybrid apps. WinUI 3 was launched as a successor to UWP, and Blazor Hybrid apps give web developers a way to build for desktop and mobile clients.</a:t>
-            </a:r>
-          </a:p>
-          <a:p>
-            <a:endParaRPr lang="en-US" dirty="0"/>
-          </a:p>
-          <a:p>
-            <a:r>
-              <a:rPr lang="en-US" dirty="0"/>
-              <a:t>We’ll also talk about some new options that allow you to target Windows and beyond. .NET MAUI is the successor to </a:t>
+              <a:t>WinForms has been there for every step of the way. Even before WinForms and .NET, Microsoft has had a forms designer for Windows apps. In 1991, Bill Gates demoed the first VB form designer.</a:t>
+            </a:r>
+          </a:p>
+          <a:p>
+            <a:endParaRPr lang="en-US" dirty="0"/>
+          </a:p>
+          <a:p>
+            <a:r>
+              <a:rPr lang="en-US" dirty="0"/>
+              <a:t>WPF was introduced with Windows Vista in 2006 and was the first XAML-based UI framework from Microsoft. WPF became a big deal for enterprise developers, and quickly became the de-facto choice for businesses building enterprise Windows apps.</a:t>
+            </a:r>
+          </a:p>
+          <a:p>
+            <a:endParaRPr lang="en-US" dirty="0"/>
+          </a:p>
+          <a:p>
+            <a:r>
+              <a:rPr lang="en-US" dirty="0"/>
+              <a:t>We’ll skip over the Windows 8 XAML apps that debuted in 2012 and talk briefly about UWP apps. They were introduced in 2015 with Windows 10, and UWP apps gave developers a way to target Windows on desktops, phones, HoloLens, and Xbox with a single code base. They had some success with ISVs building consumer apps but got traction in the enterprise.</a:t>
+            </a:r>
+          </a:p>
+          <a:p>
+            <a:endParaRPr lang="en-US" dirty="0"/>
+          </a:p>
+          <a:p>
+            <a:r>
+              <a:rPr lang="en-US" dirty="0"/>
+              <a:t>2021 gave use two new options for Windows apps, WinUI 3 (and the Windows App SDK) and Blazor Hybrid apps. WinUI 3 was launched as a successor to UWP, and Blazor Hybrid apps introduced a way for web developers to build desktop and mobile clients with .NET.</a:t>
+            </a:r>
+          </a:p>
+          <a:p>
+            <a:endParaRPr lang="en-US" dirty="0"/>
+          </a:p>
+          <a:p>
+            <a:r>
+              <a:rPr lang="en-US" dirty="0"/>
+              <a:t>We’ll also talk about some options that allow you to target multiple platforms. .NET MAUI is the successor to </a:t>
             </a:r>
             <a:r>
               <a:rPr lang="en-US" dirty="0" err="1"/>
@@ -2990,24 +3012,16 @@
             </a:r>
             <a:r>
               <a:rPr lang="en-US" dirty="0"/>
-              <a:t>, and it allows you to use XAML and C# to build apps for Windows, macOS, iOS, Android and Samsung watches &amp; smart TVs. There are some 3</a:t>
-            </a:r>
-            <a:r>
-              <a:rPr lang="en-US" baseline="30000" dirty="0"/>
-              <a:t>rd</a:t>
-            </a:r>
-            <a:r>
-              <a:rPr lang="en-US" dirty="0"/>
-              <a:t> party options that we’ll touch on as time permits. Uno Platform and Avalonia UI both target the same platforms as MAUI in addition to Linux and web support (with WebAssembly).</a:t>
-            </a:r>
-          </a:p>
-          <a:p>
-            <a:endParaRPr lang="en-US" dirty="0"/>
-          </a:p>
-          <a:p>
-            <a:r>
-              <a:rPr lang="en-US" dirty="0"/>
-              <a:t>If we had more time, we could also talk about Flutter, React Native for Windows, JavaFX, Electron, and many other options for building apps for Windows and beyond.</a:t>
+              <a:t>, and it allows you to use XAML and C# to build apps for Windows, macOS, and mobile devices. There are some third-party options that we’ll touch too. Uno Platform and Avalonia UI both target the same platforms as MAUI in addition to Linux and web support (with WebAssembly).</a:t>
+            </a:r>
+          </a:p>
+          <a:p>
+            <a:endParaRPr lang="en-US" dirty="0"/>
+          </a:p>
+          <a:p>
+            <a:r>
+              <a:rPr lang="en-US" dirty="0"/>
+              <a:t>If we had more time, we could also talk about some non-.NET options like Flutter, React Native for Windows, and Electron.</a:t>
             </a:r>
           </a:p>
         </p:txBody>
@@ -3071,7 +3085,7 @@
           <a:p>
             <a:r>
               <a:rPr lang="en-US" dirty="0"/>
-              <a:t>Here are a few examples of Windows user interfaces created with different UI Frameworks.</a:t>
+              <a:t>These are a few examples of Windows UIs that were created with some of the frameworks we’re discussing today.</a:t>
             </a:r>
           </a:p>
           <a:p>
@@ -3089,15 +3103,7 @@
           <a:p>
             <a:r>
               <a:rPr lang="en-US" dirty="0"/>
-              <a:t>The upper-left screenshot is probably the type of UI you picture when you hear Windows Forms. It looks very Windows XP… utilitarian. I’ve probably created </a:t>
-            </a:r>
-            <a:r>
-              <a:rPr lang="en-US" dirty="0" err="1"/>
-              <a:t>Uis</a:t>
-            </a:r>
-            <a:r>
-              <a:rPr lang="en-US" dirty="0"/>
-              <a:t> similar to this in VB 6 back in the day.</a:t>
+              <a:t>The upper-left screenshot is probably the type of UI you picture when you hear Windows Forms. It looks very Windows 7… utilitarian. This is a screenshot of the sample app will be exploring later in this session.</a:t>
             </a:r>
           </a:p>
           <a:p>
@@ -3115,25 +3121,34 @@
           <a:p>
             <a:r>
               <a:rPr lang="en-US" dirty="0"/>
-              <a:t>The screen in the middle probably looks familiar. That’s Visual Studio 2022 with the preview UI for their Extension Manager open. Nearly all of the Visual Studio UI is WPF. There are a few remaining legacy dialogs left (like the Options dialog), but it’s mostly WPF.</a:t>
-            </a:r>
-          </a:p>
-          <a:p>
-            <a:endParaRPr lang="en-US" dirty="0"/>
-          </a:p>
-          <a:p>
-            <a:r>
-              <a:rPr lang="en-US" dirty="0"/>
-              <a:t>The lower-center screens are created with .NET MAUI. Microsoft created a weather app that is responsive to different desktop and mobile form factors. You can get the source code for this app on GitHub. Just search for .NET MAUI weather sample app.</a:t>
-            </a:r>
-          </a:p>
-          <a:p>
-            <a:endParaRPr lang="en-US" dirty="0"/>
-          </a:p>
-          <a:p>
-            <a:r>
-              <a:rPr lang="en-US" dirty="0"/>
-              <a:t>The top right image is a screenshot of my Windows File Explorer in Windows 11. The new builds of Windows 11 have a File Explorer that is built with WinUI. Microsoft and some key partners like Apple and Adobe have been using WinUI and Windows App SDK to create some desktop apps in the last year or so. The Apple Music app is the last image here. You can download Apple Music, as well as Apple TV and Apple Devices apps from the Microsoft Store. All three were built with WinUI. Adobe’s WinUI app is Fresco, you can check that out on the Microsoft Store.</a:t>
+              <a:t>The screen in the middle probably looks familiar. That’s Visual Studio 2022. Nearly all the Visual Studio UI is WPF. There are a few remaining legacy dialogs (like the Options dialog), but it’s mostly WPF.</a:t>
+            </a:r>
+          </a:p>
+          <a:p>
+            <a:endParaRPr lang="en-US" dirty="0"/>
+          </a:p>
+          <a:p>
+            <a:r>
+              <a:rPr lang="en-US" dirty="0"/>
+              <a:t>The screens below Visual Studio were created with .NET MAUI. Microsoft built a weather sample app that’s responsive to different desktop and mobile form factors. You can get the source code for this app on GitHub. Just search for .NET MAUI weather sample app.</a:t>
+            </a:r>
+          </a:p>
+          <a:p>
+            <a:endParaRPr lang="en-US" dirty="0"/>
+          </a:p>
+          <a:p>
+            <a:r>
+              <a:rPr lang="en-US" dirty="0"/>
+              <a:t>The top right image is a screenshot of Windows File Explorer in Windows 11. The latest builds of Windows 11 have a File Explorer that was created with WinUI. Microsoft and some key partners like Apple and Adobe have been using WinUI to create some high-profile desktop apps over the last couple of years.</a:t>
+            </a:r>
+          </a:p>
+          <a:p>
+            <a:endParaRPr lang="en-US" dirty="0"/>
+          </a:p>
+          <a:p>
+            <a:r>
+              <a:rPr lang="en-US" dirty="0"/>
+              <a:t>The Apple Music app is the last image here. You can download the Apple Music, Apple TV, and Apple Devices apps from the Microsoft Store. All three were built with WinUI. Adobe’s WinUI app is called Fresco, you can also install Fresco from the Microsoft Store.</a:t>
             </a:r>
           </a:p>
         </p:txBody>
@@ -3197,51 +3212,49 @@
           <a:p>
             <a:r>
               <a:rPr lang="en-US" dirty="0"/>
-              <a:t>Let’s get into the details of each framework, starting with Windows Forms…</a:t>
-            </a:r>
-          </a:p>
-          <a:p>
-            <a:endParaRPr lang="en-US" dirty="0"/>
-          </a:p>
-          <a:p>
-            <a:r>
-              <a:rPr lang="en-US" dirty="0"/>
-              <a:t>Developers love WinForms because it lets you build simple apps fast. It has a visual drag &amp; drop designer to build your UI, and everything is C# (or VB) code. There’s no separate language or markup to construct the UI.</a:t>
-            </a:r>
-          </a:p>
-          <a:p>
-            <a:endParaRPr lang="en-US" dirty="0"/>
-          </a:p>
-          <a:p>
-            <a:r>
-              <a:rPr lang="en-US" dirty="0"/>
-              <a:t>As we saw on the previous slide, there has been strong 3</a:t>
-            </a:r>
-            <a:r>
-              <a:rPr lang="en-US" baseline="30000" dirty="0"/>
-              <a:t>rd</a:t>
-            </a:r>
-            <a:r>
-              <a:rPr lang="en-US" dirty="0"/>
-              <a:t> party support for WinForms controls for years.</a:t>
-            </a:r>
-          </a:p>
-          <a:p>
-            <a:endParaRPr lang="en-US" dirty="0"/>
-          </a:p>
-          <a:p>
-            <a:r>
-              <a:rPr lang="en-US" dirty="0"/>
-              <a:t>You have two options for creating a new WinForms project. Most of you will want to select the modern .NET option ( that’s .NET 8 today), but you still do have the option to create a new WinForms project on .NET Framework. If you have clients running unsupported Windows 7 machines, you can still build and maintain .NET client apps for them.</a:t>
-            </a:r>
-          </a:p>
-          <a:p>
-            <a:endParaRPr lang="en-US" dirty="0"/>
-          </a:p>
-          <a:p>
-            <a:r>
-              <a:rPr lang="en-US" dirty="0"/>
-              <a:t>If you have existing .NET Framework WinForms apps that you’d like to modernize, Microsoft has a .NET Upgrade tool you can use to move them to .NET 8 to take advantage of the performance and features of today’s .NET. This tool can also upgrade legacy WPF apps to .NET 8 WPF, </a:t>
+              <a:t>Let’s get into some details with each framework, starting with Windows Forms. WinForms is probably still the most used Windows framework when it comes to starting a new project.</a:t>
+            </a:r>
+          </a:p>
+          <a:p>
+            <a:endParaRPr lang="en-US" dirty="0"/>
+          </a:p>
+          <a:p>
+            <a:r>
+              <a:rPr lang="en-US" dirty="0"/>
+              <a:t>.NET developers love WinForms because it lets you build apps fast. It has a visual drag &amp; drop designer to build your UI, and everything is C# (or VB) code. There’s no separate language or markup used to build the UI.</a:t>
+            </a:r>
+          </a:p>
+          <a:p>
+            <a:endParaRPr lang="en-US" dirty="0"/>
+          </a:p>
+          <a:p>
+            <a:r>
+              <a:rPr lang="en-US" dirty="0"/>
+              <a:t>As we saw on the previous slide, there has been strong third-party support for WinForms controls for years (decades, really).</a:t>
+            </a:r>
+          </a:p>
+          <a:p>
+            <a:endParaRPr lang="en-US" dirty="0"/>
+          </a:p>
+          <a:p>
+            <a:r>
+              <a:rPr lang="en-US" dirty="0"/>
+              <a:t>You have two options when you create a new WinForms project. You’ll typically want to select the modern .NET option (that’s .NET 8 today), but you still do have the option to create a new WinForms project on .NET Framework. The templates for both are part of Visual Studio 2022. If you have clients running unsupported Windows 7 machines, you can still build and maintain .NET client apps for them.</a:t>
+            </a:r>
+          </a:p>
+          <a:p>
+            <a:endParaRPr lang="en-US" dirty="0"/>
+          </a:p>
+          <a:p>
+            <a:r>
+              <a:rPr lang="en-US" dirty="0"/>
+              <a:t>If you have existing .NET Framework WinForms apps that you’d like to modernize, Microsoft has a .NET Upgrade tool you can use to move them to .NET 8 to take advantage of the performance and features of today’s .NET.</a:t>
+            </a:r>
+          </a:p>
+          <a:p>
+            <a:r>
+              <a:rPr lang="en-US" dirty="0"/>
+              <a:t>	This tool can also upgrade legacy WPF apps to WPF on .NET 8, </a:t>
             </a:r>
             <a:r>
               <a:rPr lang="en-US" dirty="0" err="1"/>
@@ -3249,7 +3262,7 @@
             </a:r>
             <a:r>
               <a:rPr lang="en-US" dirty="0"/>
-              <a:t> apps to .NET MAUI, or UWP apps to WinUI.</a:t>
+              <a:t> apps to .NET MAUI, or UWP apps to WinUI. The tool will also provide a list of any issues encountered during the upgrade.</a:t>
             </a:r>
           </a:p>
           <a:p>
@@ -3331,16 +3344,16 @@
           <a:p>
             <a:r>
               <a:rPr lang="en-US" dirty="0"/>
-              <a:t>Let’s briefly touch on a few reasons why you may decide not to choose Windows Forms, and then we’ll look at some code.</a:t>
-            </a:r>
-          </a:p>
-          <a:p>
-            <a:endParaRPr lang="en-US" dirty="0"/>
-          </a:p>
-          <a:p>
-            <a:r>
-              <a:rPr lang="en-US" dirty="0"/>
-              <a:t>Without any custom theming applied, WinForms looks dated. It’s had some updates to improve the UI a bit since Windows XP, but you won’t be implementing Microsoft Fluent Design or Google’s Material Design in a WinForms app any time soon.</a:t>
+              <a:t>Let’s briefly touch on a few reasons why you might not choose Windows Forms, and then we’ll look at the sample app.</a:t>
+            </a:r>
+          </a:p>
+          <a:p>
+            <a:endParaRPr lang="en-US" dirty="0"/>
+          </a:p>
+          <a:p>
+            <a:r>
+              <a:rPr lang="en-US" dirty="0"/>
+              <a:t>Without any custom theming applied, WinForms looks dated. It’s had some updates to improve the UI over the years, but you won’t be implementing Microsoft Fluent Design in a WinForms app any time soon.</a:t>
             </a:r>
           </a:p>
           <a:p>
@@ -3367,24 +3380,16 @@
           <a:p>
             <a:r>
               <a:rPr lang="en-US" dirty="0"/>
-              <a:t>There’s no built-in support for switching between light &amp; dark themes when users update their Windows theme. We saw earlier that there are some 3</a:t>
-            </a:r>
-            <a:r>
-              <a:rPr lang="en-US" baseline="30000" dirty="0"/>
-              <a:t>rd</a:t>
-            </a:r>
-            <a:r>
-              <a:rPr lang="en-US" dirty="0"/>
-              <a:t> party theming options for with light and dark themes though.</a:t>
-            </a:r>
-          </a:p>
-          <a:p>
-            <a:endParaRPr lang="en-US" dirty="0"/>
-          </a:p>
-          <a:p>
-            <a:r>
-              <a:rPr lang="en-US" dirty="0"/>
-              <a:t>It’s also not the best choice if touch input or ink are important to your users.</a:t>
+              <a:t>There’s no built-in support for switching between light &amp; dark themes when users update their Windows theme. We saw earlier that there are some third-party theming options for with light and dark themes though.</a:t>
+            </a:r>
+          </a:p>
+          <a:p>
+            <a:endParaRPr lang="en-US" dirty="0"/>
+          </a:p>
+          <a:p>
+            <a:r>
+              <a:rPr lang="en-US" dirty="0"/>
+              <a:t>It’s also not the best choice if touch input or inking are important to your users.</a:t>
             </a:r>
           </a:p>
           <a:p>
@@ -3457,7 +3462,7 @@
           <a:p>
             <a:r>
               <a:rPr lang="en-US" dirty="0"/>
-              <a:t>Next up is the Windows Presentation Foundation or WPF…</a:t>
+              <a:t>Next up is WPF…</a:t>
             </a:r>
           </a:p>
           <a:p>
@@ -3484,7 +3489,7 @@
           <a:p>
             <a:r>
               <a:rPr lang="en-US" dirty="0"/>
-              <a:t>As I mentioned on the WinForms slide, XAML-based UIs are GPU accelerated, being rendered on in the DirectX pipeline. This helps with UI rendering performance.</a:t>
+              <a:t>As I mentioned on the WinForms slide, XAML-based UIs are GPU accelerated, which means they’re rendered by the DirectX pipeline. This helps with UI rendering performance, offloading some work from the CPU.</a:t>
             </a:r>
           </a:p>
           <a:p>
@@ -3519,24 +3524,25 @@
           <a:p>
             <a:r>
               <a:rPr lang="en-US" dirty="0"/>
-              <a:t>Like WinForms, WPF has modern .NET and .NET Framework project options and extensive 3</a:t>
-            </a:r>
-            <a:r>
-              <a:rPr lang="en-US" baseline="30000" dirty="0"/>
-              <a:t>rd</a:t>
-            </a:r>
-            <a:r>
-              <a:rPr lang="en-US" dirty="0"/>
-              <a:t> party product support. It’s under active development, and if you check out the roadmap on GitHub, you’ll see that they’re working on built-in theming support for Windows 11. WPF apps will finally have a more modern look out-of-the-box.</a:t>
-            </a:r>
-          </a:p>
-          <a:p>
-            <a:endParaRPr lang="en-US" dirty="0"/>
-          </a:p>
-          <a:p>
-            <a:r>
-              <a:rPr lang="en-US" dirty="0"/>
-              <a:t>WPF is still the framework of choice for many companies building line-of-business apps for Windows, and Microsoft continues to position it as such.</a:t>
+              <a:t>Like WinForms, WPF has .NET 8 and .NET Framework project options and extensive third-party library support.</a:t>
+            </a:r>
+          </a:p>
+          <a:p>
+            <a:endParaRPr lang="en-US" dirty="0"/>
+          </a:p>
+          <a:p>
+            <a:r>
+              <a:rPr lang="en-US" dirty="0"/>
+              <a:t>It’s under active development, and if you check out the roadmap on GitHub, you’ll see that they’re working on built-in theming support for Windows 11. WPF apps will finally have a more modern look out-of-the-box.</a:t>
+            </a:r>
+          </a:p>
+          <a:p>
+            <a:endParaRPr lang="en-US" dirty="0"/>
+          </a:p>
+          <a:p>
+            <a:r>
+              <a:rPr lang="en-US" dirty="0"/>
+              <a:t>WPF is the framework of choice for many companies building complex line-of-business apps for Windows today.</a:t>
             </a:r>
           </a:p>
         </p:txBody>
@@ -3733,7 +3739,7 @@
           <a:p>
             <a:fld id="{D088F999-7A4E-6B4F-9FED-EF75B73AD044}" type="datetimeFigureOut">
               <a:rPr lang="en-US" smtClean="0"/>
-              <a:t>4/28/2024</a:t>
+              <a:t>4/29/2024</a:t>
             </a:fld>
             <a:endParaRPr lang="en-US"/>
           </a:p>
@@ -3901,7 +3907,7 @@
           <a:p>
             <a:fld id="{D088F999-7A4E-6B4F-9FED-EF75B73AD044}" type="datetimeFigureOut">
               <a:rPr lang="en-US" smtClean="0"/>
-              <a:t>4/28/2024</a:t>
+              <a:t>4/29/2024</a:t>
             </a:fld>
             <a:endParaRPr lang="en-US"/>
           </a:p>
@@ -4079,7 +4085,7 @@
           <a:p>
             <a:fld id="{D088F999-7A4E-6B4F-9FED-EF75B73AD044}" type="datetimeFigureOut">
               <a:rPr lang="en-US" smtClean="0"/>
-              <a:t>4/28/2024</a:t>
+              <a:t>4/29/2024</a:t>
             </a:fld>
             <a:endParaRPr lang="en-US"/>
           </a:p>
@@ -4248,7 +4254,7 @@
             <a:fld id="{3FE51E94-D08C-431E-88FC-7EB62E529A19}" type="datetimeFigureOut">
               <a:rPr lang="en-US" smtClean="0"/>
               <a:pPr/>
-              <a:t>4/28/2024</a:t>
+              <a:t>4/29/2024</a:t>
             </a:fld>
             <a:endParaRPr lang="en-US"/>
           </a:p>
@@ -4417,7 +4423,7 @@
           <a:p>
             <a:fld id="{D088F999-7A4E-6B4F-9FED-EF75B73AD044}" type="datetimeFigureOut">
               <a:rPr lang="en-US" smtClean="0"/>
-              <a:t>4/28/2024</a:t>
+              <a:t>4/29/2024</a:t>
             </a:fld>
             <a:endParaRPr lang="en-US"/>
           </a:p>
@@ -4662,7 +4668,7 @@
           <a:p>
             <a:fld id="{D088F999-7A4E-6B4F-9FED-EF75B73AD044}" type="datetimeFigureOut">
               <a:rPr lang="en-US" smtClean="0"/>
-              <a:t>4/28/2024</a:t>
+              <a:t>4/29/2024</a:t>
             </a:fld>
             <a:endParaRPr lang="en-US"/>
           </a:p>
@@ -4947,7 +4953,7 @@
           <a:p>
             <a:fld id="{D088F999-7A4E-6B4F-9FED-EF75B73AD044}" type="datetimeFigureOut">
               <a:rPr lang="en-US" smtClean="0"/>
-              <a:t>4/28/2024</a:t>
+              <a:t>4/29/2024</a:t>
             </a:fld>
             <a:endParaRPr lang="en-US"/>
           </a:p>
@@ -5366,7 +5372,7 @@
           <a:p>
             <a:fld id="{D088F999-7A4E-6B4F-9FED-EF75B73AD044}" type="datetimeFigureOut">
               <a:rPr lang="en-US" smtClean="0"/>
-              <a:t>4/28/2024</a:t>
+              <a:t>4/29/2024</a:t>
             </a:fld>
             <a:endParaRPr lang="en-US"/>
           </a:p>
@@ -5483,7 +5489,7 @@
           <a:p>
             <a:fld id="{D088F999-7A4E-6B4F-9FED-EF75B73AD044}" type="datetimeFigureOut">
               <a:rPr lang="en-US" smtClean="0"/>
-              <a:t>4/28/2024</a:t>
+              <a:t>4/29/2024</a:t>
             </a:fld>
             <a:endParaRPr lang="en-US"/>
           </a:p>
@@ -5578,7 +5584,7 @@
           <a:p>
             <a:fld id="{D088F999-7A4E-6B4F-9FED-EF75B73AD044}" type="datetimeFigureOut">
               <a:rPr lang="en-US" smtClean="0"/>
-              <a:t>4/28/2024</a:t>
+              <a:t>4/29/2024</a:t>
             </a:fld>
             <a:endParaRPr lang="en-US"/>
           </a:p>
@@ -5853,7 +5859,7 @@
           <a:p>
             <a:fld id="{D088F999-7A4E-6B4F-9FED-EF75B73AD044}" type="datetimeFigureOut">
               <a:rPr lang="en-US" smtClean="0"/>
-              <a:t>4/28/2024</a:t>
+              <a:t>4/29/2024</a:t>
             </a:fld>
             <a:endParaRPr lang="en-US"/>
           </a:p>
@@ -6105,7 +6111,7 @@
           <a:p>
             <a:fld id="{D088F999-7A4E-6B4F-9FED-EF75B73AD044}" type="datetimeFigureOut">
               <a:rPr lang="en-US" smtClean="0"/>
-              <a:t>4/28/2024</a:t>
+              <a:t>4/29/2024</a:t>
             </a:fld>
             <a:endParaRPr lang="en-US"/>
           </a:p>
@@ -6325,7 +6331,7 @@
           <a:p>
             <a:fld id="{D088F999-7A4E-6B4F-9FED-EF75B73AD044}" type="datetimeFigureOut">
               <a:rPr lang="en-US" smtClean="0"/>
-              <a:t>4/28/2024</a:t>
+              <a:t>4/29/2024</a:t>
             </a:fld>
             <a:endParaRPr lang="en-US"/>
           </a:p>
@@ -6842,7 +6848,7 @@
           <a:p>
             <a:fld id="{D088F999-7A4E-6B4F-9FED-EF75B73AD044}" type="datetimeFigureOut">
               <a:rPr lang="en-US" smtClean="0"/>
-              <a:t>4/28/2024</a:t>
+              <a:t>4/29/2024</a:t>
             </a:fld>
             <a:endParaRPr lang="en-US"/>
           </a:p>
@@ -7893,7 +7899,7 @@
             <a:pPr lvl="1"/>
             <a:r>
               <a:rPr lang="en-US" dirty="0"/>
-              <a:t>Default UI still looks like Windows Vista</a:t>
+              <a:t>Default UI still looks like Windows 7 or Vista</a:t>
             </a:r>
           </a:p>
           <a:p>
@@ -7965,7 +7971,7 @@
           <a:p>
             <a:r>
               <a:rPr lang="en-US" dirty="0"/>
-              <a:t>UWP Advantages</a:t>
+              <a:t>UWP Advantages*</a:t>
             </a:r>
           </a:p>
         </p:txBody>
@@ -8916,6 +8922,379 @@
 </file>
 
 <file path=ppt/slides/slide17.xml><?xml version="1.0" encoding="utf-8"?>
+<p:sld xmlns:a="http://schemas.openxmlformats.org/drawingml/2006/main" xmlns:r="http://schemas.openxmlformats.org/officeDocument/2006/relationships" xmlns:p="http://schemas.openxmlformats.org/presentationml/2006/main">
+  <p:cSld>
+    <p:spTree>
+      <p:nvGrpSpPr>
+        <p:cNvPr id="1" name=""/>
+        <p:cNvGrpSpPr/>
+        <p:nvPr/>
+      </p:nvGrpSpPr>
+      <p:grpSpPr>
+        <a:xfrm>
+          <a:off x="0" y="0"/>
+          <a:ext cx="0" cy="0"/>
+          <a:chOff x="0" y="0"/>
+          <a:chExt cx="0" cy="0"/>
+        </a:xfrm>
+      </p:grpSpPr>
+      <p:sp>
+        <p:nvSpPr>
+          <p:cNvPr id="2" name="Title 1">
+            <a:extLst>
+              <a:ext uri="{FF2B5EF4-FFF2-40B4-BE49-F238E27FC236}">
+                <a16:creationId xmlns:a16="http://schemas.microsoft.com/office/drawing/2014/main" id="{0472805C-6593-478E-93F9-0DA4426370EE}"/>
+              </a:ext>
+            </a:extLst>
+          </p:cNvPr>
+          <p:cNvSpPr>
+            <a:spLocks noGrp="1"/>
+          </p:cNvSpPr>
+          <p:nvPr>
+            <p:ph type="title"/>
+          </p:nvPr>
+        </p:nvSpPr>
+        <p:spPr/>
+        <p:txBody>
+          <a:bodyPr>
+            <a:noAutofit/>
+          </a:bodyPr>
+          <a:lstStyle/>
+          <a:p>
+            <a:r>
+              <a:rPr lang="en-US" sz="2800" dirty="0"/>
+              <a:t>Blazor Hybrid – Leverage web skills on native platforms</a:t>
+            </a:r>
+          </a:p>
+        </p:txBody>
+      </p:sp>
+      <p:sp>
+        <p:nvSpPr>
+          <p:cNvPr id="4" name="Content Placeholder 3">
+            <a:extLst>
+              <a:ext uri="{FF2B5EF4-FFF2-40B4-BE49-F238E27FC236}">
+                <a16:creationId xmlns:a16="http://schemas.microsoft.com/office/drawing/2014/main" id="{A1F8001B-9B86-DD0D-FACE-732B6A9B2E56}"/>
+              </a:ext>
+            </a:extLst>
+          </p:cNvPr>
+          <p:cNvSpPr>
+            <a:spLocks noGrp="1"/>
+          </p:cNvSpPr>
+          <p:nvPr>
+            <p:ph sz="half" idx="1"/>
+          </p:nvPr>
+        </p:nvSpPr>
+        <p:spPr/>
+        <p:txBody>
+          <a:bodyPr>
+            <a:normAutofit lnSpcReduction="10000"/>
+          </a:bodyPr>
+          <a:lstStyle/>
+          <a:p>
+            <a:pPr marL="0" indent="0">
+              <a:spcAft>
+                <a:spcPts val="600"/>
+              </a:spcAft>
+              <a:buNone/>
+            </a:pPr>
+            <a:r>
+              <a:rPr lang="en-US" sz="1800" b="1" kern="1200" dirty="0">
+                <a:solidFill>
+                  <a:schemeClr val="tx1"/>
+                </a:solidFill>
+                <a:latin typeface="+mn-lt"/>
+                <a:ea typeface="+mn-ea"/>
+                <a:cs typeface="+mn-cs"/>
+              </a:rPr>
+              <a:t>Pros</a:t>
+            </a:r>
+          </a:p>
+          <a:p>
+            <a:pPr marL="742950" lvl="1" indent="-285750">
+              <a:spcAft>
+                <a:spcPts val="600"/>
+              </a:spcAft>
+              <a:buFont typeface="Arial" panose="020B0604020202020204" pitchFamily="34" charset="0"/>
+              <a:buChar char="•"/>
+            </a:pPr>
+            <a:r>
+              <a:rPr lang="en-US" sz="1800" kern="1200" dirty="0">
+                <a:solidFill>
+                  <a:schemeClr val="tx1"/>
+                </a:solidFill>
+                <a:latin typeface="+mn-lt"/>
+                <a:ea typeface="+mn-ea"/>
+                <a:cs typeface="+mn-cs"/>
+              </a:rPr>
+              <a:t>No XAML learning curve for web developers</a:t>
+            </a:r>
+          </a:p>
+          <a:p>
+            <a:pPr marL="742950" lvl="1" indent="-285750">
+              <a:spcAft>
+                <a:spcPts val="600"/>
+              </a:spcAft>
+              <a:buFont typeface="Arial" panose="020B0604020202020204" pitchFamily="34" charset="0"/>
+              <a:buChar char="•"/>
+            </a:pPr>
+            <a:r>
+              <a:rPr lang="en-US" sz="1800" kern="1200" dirty="0">
+                <a:solidFill>
+                  <a:schemeClr val="tx1"/>
+                </a:solidFill>
+                <a:latin typeface="+mn-lt"/>
+                <a:ea typeface="+mn-ea"/>
+                <a:cs typeface="+mn-cs"/>
+              </a:rPr>
+              <a:t>Powerful CSS styling</a:t>
+            </a:r>
+          </a:p>
+          <a:p>
+            <a:pPr marL="742950" lvl="1" indent="-285750">
+              <a:spcAft>
+                <a:spcPts val="600"/>
+              </a:spcAft>
+              <a:buFont typeface="Arial" panose="020B0604020202020204" pitchFamily="34" charset="0"/>
+              <a:buChar char="•"/>
+            </a:pPr>
+            <a:r>
+              <a:rPr lang="en-US" sz="1800" kern="1200" dirty="0">
+                <a:solidFill>
+                  <a:schemeClr val="tx1"/>
+                </a:solidFill>
+                <a:latin typeface="+mn-lt"/>
+                <a:ea typeface="+mn-ea"/>
+                <a:cs typeface="+mn-cs"/>
+              </a:rPr>
+              <a:t>.NET compatibility</a:t>
+            </a:r>
+          </a:p>
+          <a:p>
+            <a:pPr marL="742950" lvl="1" indent="-285750">
+              <a:spcAft>
+                <a:spcPts val="600"/>
+              </a:spcAft>
+              <a:buFont typeface="Arial" panose="020B0604020202020204" pitchFamily="34" charset="0"/>
+              <a:buChar char="•"/>
+            </a:pPr>
+            <a:r>
+              <a:rPr lang="en-US" sz="1800" kern="1200" dirty="0">
+                <a:solidFill>
+                  <a:schemeClr val="tx1"/>
+                </a:solidFill>
+                <a:latin typeface="+mn-lt"/>
+                <a:ea typeface="+mn-ea"/>
+                <a:cs typeface="+mn-cs"/>
+              </a:rPr>
+              <a:t>Use WPF or WinForms to integrate with existing desktop apps</a:t>
+            </a:r>
+          </a:p>
+          <a:p>
+            <a:pPr marL="742950" lvl="1" indent="-285750">
+              <a:spcAft>
+                <a:spcPts val="600"/>
+              </a:spcAft>
+              <a:buFont typeface="Arial" panose="020B0604020202020204" pitchFamily="34" charset="0"/>
+              <a:buChar char="•"/>
+            </a:pPr>
+            <a:r>
+              <a:rPr lang="en-US" sz="1800" kern="1200" dirty="0">
+                <a:solidFill>
+                  <a:schemeClr val="tx1"/>
+                </a:solidFill>
+                <a:latin typeface="+mn-lt"/>
+                <a:ea typeface="+mn-ea"/>
+                <a:cs typeface="+mn-cs"/>
+              </a:rPr>
+              <a:t>Use .NET MAUI host for mobile apps</a:t>
+            </a:r>
+            <a:endParaRPr lang="en-US" dirty="0"/>
+          </a:p>
+          <a:p>
+            <a:endParaRPr lang="en-US" dirty="0"/>
+          </a:p>
+        </p:txBody>
+      </p:sp>
+      <p:sp>
+        <p:nvSpPr>
+          <p:cNvPr id="5" name="Content Placeholder 4">
+            <a:extLst>
+              <a:ext uri="{FF2B5EF4-FFF2-40B4-BE49-F238E27FC236}">
+                <a16:creationId xmlns:a16="http://schemas.microsoft.com/office/drawing/2014/main" id="{9D6D317E-BA97-1960-3496-276800AED453}"/>
+              </a:ext>
+            </a:extLst>
+          </p:cNvPr>
+          <p:cNvSpPr>
+            <a:spLocks noGrp="1"/>
+          </p:cNvSpPr>
+          <p:nvPr>
+            <p:ph sz="half" idx="2"/>
+          </p:nvPr>
+        </p:nvSpPr>
+        <p:spPr/>
+        <p:txBody>
+          <a:bodyPr>
+            <a:normAutofit lnSpcReduction="10000"/>
+          </a:bodyPr>
+          <a:lstStyle/>
+          <a:p>
+            <a:pPr marL="0" indent="0">
+              <a:spcAft>
+                <a:spcPts val="600"/>
+              </a:spcAft>
+              <a:buNone/>
+            </a:pPr>
+            <a:r>
+              <a:rPr lang="en-US" sz="1800" b="1" kern="1200" dirty="0">
+                <a:solidFill>
+                  <a:schemeClr val="tx1"/>
+                </a:solidFill>
+                <a:latin typeface="+mn-lt"/>
+                <a:ea typeface="+mn-ea"/>
+                <a:cs typeface="+mn-cs"/>
+              </a:rPr>
+              <a:t>Cons</a:t>
+            </a:r>
+          </a:p>
+          <a:p>
+            <a:pPr marL="742950" lvl="1" indent="-285750">
+              <a:spcAft>
+                <a:spcPts val="600"/>
+              </a:spcAft>
+              <a:buFont typeface="Arial" panose="020B0604020202020204" pitchFamily="34" charset="0"/>
+              <a:buChar char="•"/>
+            </a:pPr>
+            <a:r>
+              <a:rPr lang="en-US" sz="1800" kern="1200" dirty="0">
+                <a:solidFill>
+                  <a:schemeClr val="tx1"/>
+                </a:solidFill>
+                <a:latin typeface="+mn-lt"/>
+                <a:ea typeface="+mn-ea"/>
+                <a:cs typeface="+mn-cs"/>
+              </a:rPr>
+              <a:t>Interop has costs</a:t>
+            </a:r>
+          </a:p>
+          <a:p>
+            <a:pPr marL="1200150" lvl="2" indent="-285750">
+              <a:spcAft>
+                <a:spcPts val="600"/>
+              </a:spcAft>
+              <a:buFont typeface="Arial" panose="020B0604020202020204" pitchFamily="34" charset="0"/>
+              <a:buChar char="•"/>
+            </a:pPr>
+            <a:r>
+              <a:rPr lang="en-US" sz="1800" kern="1200" dirty="0">
+                <a:solidFill>
+                  <a:schemeClr val="tx1"/>
+                </a:solidFill>
+                <a:latin typeface="+mn-lt"/>
+                <a:ea typeface="+mn-ea"/>
+                <a:cs typeface="+mn-cs"/>
+              </a:rPr>
+              <a:t>Performance</a:t>
+            </a:r>
+          </a:p>
+          <a:p>
+            <a:pPr marL="1200150" lvl="2" indent="-285750">
+              <a:spcAft>
+                <a:spcPts val="600"/>
+              </a:spcAft>
+              <a:buFont typeface="Arial" panose="020B0604020202020204" pitchFamily="34" charset="0"/>
+              <a:buChar char="•"/>
+            </a:pPr>
+            <a:r>
+              <a:rPr lang="en-US" sz="1800" kern="1200" dirty="0">
+                <a:solidFill>
+                  <a:schemeClr val="tx1"/>
+                </a:solidFill>
+                <a:latin typeface="+mn-lt"/>
+                <a:ea typeface="+mn-ea"/>
+                <a:cs typeface="+mn-cs"/>
+              </a:rPr>
+              <a:t>Bugs?</a:t>
+            </a:r>
+          </a:p>
+          <a:p>
+            <a:pPr marL="1200150" lvl="2" indent="-285750">
+              <a:spcAft>
+                <a:spcPts val="600"/>
+              </a:spcAft>
+              <a:buFont typeface="Arial" panose="020B0604020202020204" pitchFamily="34" charset="0"/>
+              <a:buChar char="•"/>
+            </a:pPr>
+            <a:r>
+              <a:rPr lang="en-US" sz="1800" kern="1200" dirty="0">
+                <a:solidFill>
+                  <a:schemeClr val="tx1"/>
+                </a:solidFill>
+                <a:latin typeface="+mn-lt"/>
+                <a:ea typeface="+mn-ea"/>
+                <a:cs typeface="+mn-cs"/>
+              </a:rPr>
+              <a:t>Accessibility</a:t>
+            </a:r>
+          </a:p>
+          <a:p>
+            <a:pPr marL="1200150" lvl="2" indent="-285750">
+              <a:spcAft>
+                <a:spcPts val="600"/>
+              </a:spcAft>
+              <a:buFont typeface="Arial" panose="020B0604020202020204" pitchFamily="34" charset="0"/>
+              <a:buChar char="•"/>
+            </a:pPr>
+            <a:r>
+              <a:rPr lang="en-US" sz="1800" kern="1200" dirty="0">
+                <a:solidFill>
+                  <a:schemeClr val="tx1"/>
+                </a:solidFill>
+                <a:latin typeface="+mn-lt"/>
+                <a:ea typeface="+mn-ea"/>
+                <a:cs typeface="+mn-cs"/>
+              </a:rPr>
+              <a:t>Support across two products</a:t>
+            </a:r>
+          </a:p>
+          <a:p>
+            <a:pPr marL="742950" lvl="1" indent="-285750">
+              <a:spcAft>
+                <a:spcPts val="600"/>
+              </a:spcAft>
+              <a:buFont typeface="Arial" panose="020B0604020202020204" pitchFamily="34" charset="0"/>
+              <a:buChar char="•"/>
+            </a:pPr>
+            <a:r>
+              <a:rPr lang="en-US" sz="1800" kern="1200" dirty="0">
+                <a:solidFill>
+                  <a:schemeClr val="tx1"/>
+                </a:solidFill>
+                <a:latin typeface="+mn-lt"/>
+                <a:ea typeface="+mn-ea"/>
+                <a:cs typeface="+mn-cs"/>
+              </a:rPr>
+              <a:t>Feels like Web, not native</a:t>
+            </a:r>
+          </a:p>
+          <a:p>
+            <a:endParaRPr lang="en-US" dirty="0"/>
+          </a:p>
+        </p:txBody>
+      </p:sp>
+    </p:spTree>
+    <p:extLst>
+      <p:ext uri="{BB962C8B-B14F-4D97-AF65-F5344CB8AC3E}">
+        <p14:creationId xmlns:p14="http://schemas.microsoft.com/office/powerpoint/2010/main" val="728506196"/>
+      </p:ext>
+    </p:extLst>
+  </p:cSld>
+  <p:clrMapOvr>
+    <a:masterClrMapping/>
+  </p:clrMapOvr>
+</p:sld>
+</file>
+
+<file path=ppt/slides/slide18.xml><?xml version="1.0" encoding="utf-8"?>
 <p:sld xmlns:a="http://schemas.openxmlformats.org/drawingml/2006/main" xmlns:r="http://schemas.openxmlformats.org/officeDocument/2006/relationships" xmlns:p="http://schemas.openxmlformats.org/presentationml/2006/main">
   <p:cSld>
     <p:spTree>
@@ -9149,124 +9528,6 @@
 </p:sld>
 </file>
 
-<file path=ppt/slides/slide18.xml><?xml version="1.0" encoding="utf-8"?>
-<p:sld xmlns:a="http://schemas.openxmlformats.org/drawingml/2006/main" xmlns:r="http://schemas.openxmlformats.org/officeDocument/2006/relationships" xmlns:p="http://schemas.openxmlformats.org/presentationml/2006/main">
-  <p:cSld>
-    <p:spTree>
-      <p:nvGrpSpPr>
-        <p:cNvPr id="1" name=""/>
-        <p:cNvGrpSpPr/>
-        <p:nvPr/>
-      </p:nvGrpSpPr>
-      <p:grpSpPr>
-        <a:xfrm>
-          <a:off x="0" y="0"/>
-          <a:ext cx="0" cy="0"/>
-          <a:chOff x="0" y="0"/>
-          <a:chExt cx="0" cy="0"/>
-        </a:xfrm>
-      </p:grpSpPr>
-      <p:sp>
-        <p:nvSpPr>
-          <p:cNvPr id="2" name="Title 1">
-            <a:extLst>
-              <a:ext uri="{FF2B5EF4-FFF2-40B4-BE49-F238E27FC236}">
-                <a16:creationId xmlns:a16="http://schemas.microsoft.com/office/drawing/2014/main" id="{86DA5232-B4F4-9A79-7C4B-B5C2BC50FDE9}"/>
-              </a:ext>
-            </a:extLst>
-          </p:cNvPr>
-          <p:cNvSpPr>
-            <a:spLocks noGrp="1"/>
-          </p:cNvSpPr>
-          <p:nvPr>
-            <p:ph type="title"/>
-          </p:nvPr>
-        </p:nvSpPr>
-        <p:spPr/>
-        <p:txBody>
-          <a:bodyPr/>
-          <a:lstStyle/>
-          <a:p>
-            <a:r>
-              <a:rPr lang="en-US" dirty="0"/>
-              <a:t>Uno Platform Drawbacks &amp; Demo</a:t>
-            </a:r>
-          </a:p>
-        </p:txBody>
-      </p:sp>
-      <p:sp>
-        <p:nvSpPr>
-          <p:cNvPr id="3" name="Content Placeholder 2">
-            <a:extLst>
-              <a:ext uri="{FF2B5EF4-FFF2-40B4-BE49-F238E27FC236}">
-                <a16:creationId xmlns:a16="http://schemas.microsoft.com/office/drawing/2014/main" id="{3AC24E14-6BEC-69B3-93FF-88AC3BBCDCB2}"/>
-              </a:ext>
-            </a:extLst>
-          </p:cNvPr>
-          <p:cNvSpPr>
-            <a:spLocks noGrp="1"/>
-          </p:cNvSpPr>
-          <p:nvPr>
-            <p:ph idx="1"/>
-          </p:nvPr>
-        </p:nvSpPr>
-        <p:spPr/>
-        <p:txBody>
-          <a:bodyPr>
-            <a:normAutofit fontScale="92500" lnSpcReduction="20000"/>
-          </a:bodyPr>
-          <a:lstStyle/>
-          <a:p>
-            <a:r>
-              <a:rPr lang="en-US" dirty="0"/>
-              <a:t>No official support for VB or F#</a:t>
-            </a:r>
-          </a:p>
-          <a:p>
-            <a:r>
-              <a:rPr lang="en-US" dirty="0"/>
-              <a:t>Third-party solution</a:t>
-            </a:r>
-          </a:p>
-          <a:p>
-            <a:r>
-              <a:rPr lang="en-US" dirty="0"/>
-              <a:t>Pay for Advanced Support from Engineering Team</a:t>
-            </a:r>
-          </a:p>
-          <a:p>
-            <a:r>
-              <a:rPr lang="en-US" dirty="0"/>
-              <a:t>No XAML designer (use Hot Reload)</a:t>
-            </a:r>
-          </a:p>
-          <a:p>
-            <a:r>
-              <a:rPr lang="en-US" dirty="0"/>
-              <a:t>Some platform-specific code required for native features</a:t>
-            </a:r>
-          </a:p>
-          <a:p>
-            <a:r>
-              <a:rPr lang="en-US" dirty="0"/>
-              <a:t>Not as performant as native apps</a:t>
-            </a:r>
-          </a:p>
-        </p:txBody>
-      </p:sp>
-    </p:spTree>
-    <p:extLst>
-      <p:ext uri="{BB962C8B-B14F-4D97-AF65-F5344CB8AC3E}">
-        <p14:creationId xmlns:p14="http://schemas.microsoft.com/office/powerpoint/2010/main" val="318408692"/>
-      </p:ext>
-    </p:extLst>
-  </p:cSld>
-  <p:clrMapOvr>
-    <a:masterClrMapping/>
-  </p:clrMapOvr>
-</p:sld>
-</file>
-
 <file path=ppt/slides/slide19.xml><?xml version="1.0" encoding="utf-8"?>
 <p:sld xmlns:a="http://schemas.openxmlformats.org/drawingml/2006/main" xmlns:r="http://schemas.openxmlformats.org/officeDocument/2006/relationships" xmlns:p="http://schemas.openxmlformats.org/presentationml/2006/main">
   <p:cSld>
@@ -9289,7 +9550,7 @@
           <p:cNvPr id="2" name="Title 1">
             <a:extLst>
               <a:ext uri="{FF2B5EF4-FFF2-40B4-BE49-F238E27FC236}">
-                <a16:creationId xmlns:a16="http://schemas.microsoft.com/office/drawing/2014/main" id="{0472805C-6593-478E-93F9-0DA4426370EE}"/>
+                <a16:creationId xmlns:a16="http://schemas.microsoft.com/office/drawing/2014/main" id="{86DA5232-B4F4-9A79-7C4B-B5C2BC50FDE9}"/>
               </a:ext>
             </a:extLst>
           </p:cNvPr>
@@ -9302,24 +9563,22 @@
         </p:nvSpPr>
         <p:spPr/>
         <p:txBody>
-          <a:bodyPr>
-            <a:noAutofit/>
-          </a:bodyPr>
+          <a:bodyPr/>
           <a:lstStyle/>
           <a:p>
             <a:r>
-              <a:rPr lang="en-US" sz="2800" dirty="0"/>
-              <a:t>Blazor Hybrid – Leverage web skills on native platforms</a:t>
-            </a:r>
-          </a:p>
-        </p:txBody>
-      </p:sp>
-      <p:sp>
-        <p:nvSpPr>
-          <p:cNvPr id="4" name="Content Placeholder 3">
+              <a:rPr lang="en-US" dirty="0"/>
+              <a:t>Uno Platform Drawbacks &amp; Demo</a:t>
+            </a:r>
+          </a:p>
+        </p:txBody>
+      </p:sp>
+      <p:sp>
+        <p:nvSpPr>
+          <p:cNvPr id="3" name="Content Placeholder 2">
             <a:extLst>
               <a:ext uri="{FF2B5EF4-FFF2-40B4-BE49-F238E27FC236}">
-                <a16:creationId xmlns:a16="http://schemas.microsoft.com/office/drawing/2014/main" id="{A1F8001B-9B86-DD0D-FACE-732B6A9B2E56}"/>
+                <a16:creationId xmlns:a16="http://schemas.microsoft.com/office/drawing/2014/main" id="{3AC24E14-6BEC-69B3-93FF-88AC3BBCDCB2}"/>
               </a:ext>
             </a:extLst>
           </p:cNvPr>
@@ -9327,310 +9586,57 @@
             <a:spLocks noGrp="1"/>
           </p:cNvSpPr>
           <p:nvPr>
-            <p:ph sz="half" idx="1"/>
+            <p:ph idx="1"/>
           </p:nvPr>
         </p:nvSpPr>
         <p:spPr/>
         <p:txBody>
           <a:bodyPr>
-            <a:normAutofit lnSpcReduction="10000"/>
+            <a:normAutofit fontScale="92500" lnSpcReduction="20000"/>
           </a:bodyPr>
           <a:lstStyle/>
           <a:p>
-            <a:pPr marL="0" indent="0">
-              <a:spcAft>
-                <a:spcPts val="600"/>
-              </a:spcAft>
-              <a:buNone/>
-            </a:pPr>
-            <a:r>
-              <a:rPr lang="en-US" sz="1800" b="1" kern="1200" dirty="0">
-                <a:solidFill>
-                  <a:schemeClr val="tx1"/>
-                </a:solidFill>
-                <a:latin typeface="+mn-lt"/>
-                <a:ea typeface="+mn-ea"/>
-                <a:cs typeface="+mn-cs"/>
-              </a:rPr>
-              <a:t>Pros</a:t>
-            </a:r>
-          </a:p>
-          <a:p>
-            <a:pPr marL="742950" lvl="1" indent="-285750">
-              <a:spcAft>
-                <a:spcPts val="600"/>
-              </a:spcAft>
-              <a:buFont typeface="Arial" panose="020B0604020202020204" pitchFamily="34" charset="0"/>
-              <a:buChar char="•"/>
-            </a:pPr>
-            <a:r>
-              <a:rPr lang="en-US" sz="1800" kern="1200" dirty="0">
-                <a:solidFill>
-                  <a:schemeClr val="tx1"/>
-                </a:solidFill>
-                <a:latin typeface="+mn-lt"/>
-                <a:ea typeface="+mn-ea"/>
-                <a:cs typeface="+mn-cs"/>
-              </a:rPr>
-              <a:t>No XAML learning curve for web developers</a:t>
-            </a:r>
-          </a:p>
-          <a:p>
-            <a:pPr marL="742950" lvl="1" indent="-285750">
-              <a:spcAft>
-                <a:spcPts val="600"/>
-              </a:spcAft>
-              <a:buFont typeface="Arial" panose="020B0604020202020204" pitchFamily="34" charset="0"/>
-              <a:buChar char="•"/>
-            </a:pPr>
-            <a:r>
-              <a:rPr lang="en-US" sz="1800" kern="1200" dirty="0">
-                <a:solidFill>
-                  <a:schemeClr val="tx1"/>
-                </a:solidFill>
-                <a:latin typeface="+mn-lt"/>
-                <a:ea typeface="+mn-ea"/>
-                <a:cs typeface="+mn-cs"/>
-              </a:rPr>
-              <a:t>Powerful CSS styling</a:t>
-            </a:r>
-          </a:p>
-          <a:p>
-            <a:pPr marL="742950" lvl="1" indent="-285750">
-              <a:spcAft>
-                <a:spcPts val="600"/>
-              </a:spcAft>
-              <a:buFont typeface="Arial" panose="020B0604020202020204" pitchFamily="34" charset="0"/>
-              <a:buChar char="•"/>
-            </a:pPr>
-            <a:r>
-              <a:rPr lang="en-US" sz="1800" kern="1200" dirty="0">
-                <a:solidFill>
-                  <a:schemeClr val="tx1"/>
-                </a:solidFill>
-                <a:latin typeface="+mn-lt"/>
-                <a:ea typeface="+mn-ea"/>
-                <a:cs typeface="+mn-cs"/>
-              </a:rPr>
-              <a:t>.NET compatibility</a:t>
-            </a:r>
-          </a:p>
-          <a:p>
-            <a:pPr marL="742950" lvl="1" indent="-285750">
-              <a:spcAft>
-                <a:spcPts val="600"/>
-              </a:spcAft>
-              <a:buFont typeface="Arial" panose="020B0604020202020204" pitchFamily="34" charset="0"/>
-              <a:buChar char="•"/>
-            </a:pPr>
-            <a:r>
-              <a:rPr lang="en-US" sz="1800" kern="1200" dirty="0">
-                <a:solidFill>
-                  <a:schemeClr val="tx1"/>
-                </a:solidFill>
-                <a:latin typeface="+mn-lt"/>
-                <a:ea typeface="+mn-ea"/>
-                <a:cs typeface="+mn-cs"/>
-              </a:rPr>
-              <a:t>Use WPF or WinForms to integrate with existing desktop apps</a:t>
-            </a:r>
-          </a:p>
-          <a:p>
-            <a:pPr marL="742950" lvl="1" indent="-285750">
-              <a:spcAft>
-                <a:spcPts val="600"/>
-              </a:spcAft>
-              <a:buFont typeface="Arial" panose="020B0604020202020204" pitchFamily="34" charset="0"/>
-              <a:buChar char="•"/>
-            </a:pPr>
-            <a:r>
-              <a:rPr lang="en-US" sz="1800" kern="1200" dirty="0">
-                <a:solidFill>
-                  <a:schemeClr val="tx1"/>
-                </a:solidFill>
-                <a:latin typeface="+mn-lt"/>
-                <a:ea typeface="+mn-ea"/>
-                <a:cs typeface="+mn-cs"/>
-              </a:rPr>
-              <a:t>Use .NET MAUI host for mobile apps</a:t>
-            </a:r>
-            <a:endParaRPr lang="en-US" dirty="0"/>
-          </a:p>
-          <a:p>
-            <a:endParaRPr lang="en-US" dirty="0"/>
-          </a:p>
-        </p:txBody>
-      </p:sp>
-      <p:sp>
-        <p:nvSpPr>
-          <p:cNvPr id="5" name="Content Placeholder 4">
-            <a:extLst>
-              <a:ext uri="{FF2B5EF4-FFF2-40B4-BE49-F238E27FC236}">
-                <a16:creationId xmlns:a16="http://schemas.microsoft.com/office/drawing/2014/main" id="{9D6D317E-BA97-1960-3496-276800AED453}"/>
-              </a:ext>
-            </a:extLst>
-          </p:cNvPr>
-          <p:cNvSpPr>
-            <a:spLocks noGrp="1"/>
-          </p:cNvSpPr>
-          <p:nvPr>
-            <p:ph sz="half" idx="2"/>
-          </p:nvPr>
-        </p:nvSpPr>
-        <p:spPr/>
-        <p:txBody>
-          <a:bodyPr>
-            <a:normAutofit lnSpcReduction="10000"/>
-          </a:bodyPr>
-          <a:lstStyle/>
-          <a:p>
-            <a:pPr marL="0" indent="0">
-              <a:spcAft>
-                <a:spcPts val="600"/>
-              </a:spcAft>
-              <a:buNone/>
-            </a:pPr>
-            <a:r>
-              <a:rPr lang="en-US" sz="1800" b="1" kern="1200" dirty="0">
-                <a:solidFill>
-                  <a:schemeClr val="tx1"/>
-                </a:solidFill>
-                <a:latin typeface="+mn-lt"/>
-                <a:ea typeface="+mn-ea"/>
-                <a:cs typeface="+mn-cs"/>
-              </a:rPr>
-              <a:t>Cons</a:t>
-            </a:r>
-          </a:p>
-          <a:p>
-            <a:pPr marL="742950" lvl="1" indent="-285750">
-              <a:spcAft>
-                <a:spcPts val="600"/>
-              </a:spcAft>
-              <a:buFont typeface="Arial" panose="020B0604020202020204" pitchFamily="34" charset="0"/>
-              <a:buChar char="•"/>
-            </a:pPr>
-            <a:r>
-              <a:rPr lang="en-US" sz="1800" kern="1200" dirty="0">
-                <a:solidFill>
-                  <a:schemeClr val="tx1"/>
-                </a:solidFill>
-                <a:latin typeface="+mn-lt"/>
-                <a:ea typeface="+mn-ea"/>
-                <a:cs typeface="+mn-cs"/>
-              </a:rPr>
-              <a:t>Interop has costs</a:t>
-            </a:r>
-          </a:p>
-          <a:p>
-            <a:pPr marL="1200150" lvl="2" indent="-285750">
-              <a:spcAft>
-                <a:spcPts val="600"/>
-              </a:spcAft>
-              <a:buFont typeface="Arial" panose="020B0604020202020204" pitchFamily="34" charset="0"/>
-              <a:buChar char="•"/>
-            </a:pPr>
-            <a:r>
-              <a:rPr lang="en-US" sz="1800" kern="1200" dirty="0">
-                <a:solidFill>
-                  <a:schemeClr val="tx1"/>
-                </a:solidFill>
-                <a:latin typeface="+mn-lt"/>
-                <a:ea typeface="+mn-ea"/>
-                <a:cs typeface="+mn-cs"/>
-              </a:rPr>
-              <a:t>Performance</a:t>
-            </a:r>
-          </a:p>
-          <a:p>
-            <a:pPr marL="1200150" lvl="2" indent="-285750">
-              <a:spcAft>
-                <a:spcPts val="600"/>
-              </a:spcAft>
-              <a:buFont typeface="Arial" panose="020B0604020202020204" pitchFamily="34" charset="0"/>
-              <a:buChar char="•"/>
-            </a:pPr>
-            <a:r>
-              <a:rPr lang="en-US" sz="1800" kern="1200" dirty="0">
-                <a:solidFill>
-                  <a:schemeClr val="tx1"/>
-                </a:solidFill>
-                <a:latin typeface="+mn-lt"/>
-                <a:ea typeface="+mn-ea"/>
-                <a:cs typeface="+mn-cs"/>
-              </a:rPr>
-              <a:t>Bugs?</a:t>
-            </a:r>
-          </a:p>
-          <a:p>
-            <a:pPr marL="1200150" lvl="2" indent="-285750">
-              <a:spcAft>
-                <a:spcPts val="600"/>
-              </a:spcAft>
-              <a:buFont typeface="Arial" panose="020B0604020202020204" pitchFamily="34" charset="0"/>
-              <a:buChar char="•"/>
-            </a:pPr>
-            <a:r>
-              <a:rPr lang="en-US" sz="1800" kern="1200" dirty="0">
-                <a:solidFill>
-                  <a:schemeClr val="tx1"/>
-                </a:solidFill>
-                <a:latin typeface="+mn-lt"/>
-                <a:ea typeface="+mn-ea"/>
-                <a:cs typeface="+mn-cs"/>
-              </a:rPr>
-              <a:t>Accessibility</a:t>
-            </a:r>
-          </a:p>
-          <a:p>
-            <a:pPr marL="1200150" lvl="2" indent="-285750">
-              <a:spcAft>
-                <a:spcPts val="600"/>
-              </a:spcAft>
-              <a:buFont typeface="Arial" panose="020B0604020202020204" pitchFamily="34" charset="0"/>
-              <a:buChar char="•"/>
-            </a:pPr>
-            <a:r>
-              <a:rPr lang="en-US" sz="1800" kern="1200" dirty="0">
-                <a:solidFill>
-                  <a:schemeClr val="tx1"/>
-                </a:solidFill>
-                <a:latin typeface="+mn-lt"/>
-                <a:ea typeface="+mn-ea"/>
-                <a:cs typeface="+mn-cs"/>
-              </a:rPr>
-              <a:t>Support across two products</a:t>
-            </a:r>
-          </a:p>
-          <a:p>
-            <a:pPr marL="742950" lvl="1" indent="-285750">
-              <a:spcAft>
-                <a:spcPts val="600"/>
-              </a:spcAft>
-              <a:buFont typeface="Arial" panose="020B0604020202020204" pitchFamily="34" charset="0"/>
-              <a:buChar char="•"/>
-            </a:pPr>
-            <a:r>
-              <a:rPr lang="en-US" sz="1800" kern="1200" dirty="0">
-                <a:solidFill>
-                  <a:schemeClr val="tx1"/>
-                </a:solidFill>
-                <a:latin typeface="+mn-lt"/>
-                <a:ea typeface="+mn-ea"/>
-                <a:cs typeface="+mn-cs"/>
-              </a:rPr>
-              <a:t>Feels like Web, not native</a:t>
-            </a:r>
-          </a:p>
-          <a:p>
-            <a:endParaRPr lang="en-US" dirty="0"/>
+            <a:r>
+              <a:rPr lang="en-US" dirty="0"/>
+              <a:t>No official support for VB or F#</a:t>
+            </a:r>
+          </a:p>
+          <a:p>
+            <a:r>
+              <a:rPr lang="en-US" dirty="0"/>
+              <a:t>Third-party solution</a:t>
+            </a:r>
+          </a:p>
+          <a:p>
+            <a:r>
+              <a:rPr lang="en-US" dirty="0"/>
+              <a:t>Pay for Advanced Support from Engineering Team</a:t>
+            </a:r>
+          </a:p>
+          <a:p>
+            <a:r>
+              <a:rPr lang="en-US" dirty="0"/>
+              <a:t>No XAML designer (use Hot Reload)</a:t>
+            </a:r>
+          </a:p>
+          <a:p>
+            <a:r>
+              <a:rPr lang="en-US" dirty="0"/>
+              <a:t>Some platform-specific code required for native features</a:t>
+            </a:r>
+          </a:p>
+          <a:p>
+            <a:r>
+              <a:rPr lang="en-US" dirty="0"/>
+              <a:t>Not as performant as native apps</a:t>
+            </a:r>
           </a:p>
         </p:txBody>
       </p:sp>
     </p:spTree>
     <p:extLst>
       <p:ext uri="{BB962C8B-B14F-4D97-AF65-F5344CB8AC3E}">
-        <p14:creationId xmlns:p14="http://schemas.microsoft.com/office/powerpoint/2010/main" val="728506196"/>
+        <p14:creationId xmlns:p14="http://schemas.microsoft.com/office/powerpoint/2010/main" val="318408692"/>
       </p:ext>
     </p:extLst>
   </p:cSld>
@@ -10535,12 +10541,8 @@
           </a:p>
           <a:p>
             <a:r>
-              <a:rPr lang="en-US" dirty="0" err="1"/>
-              <a:t>TechBash</a:t>
-            </a:r>
-            <a:r>
-              <a:rPr lang="en-US" dirty="0"/>
-              <a:t> Developer Conference</a:t>
+              <a:rPr lang="en-US" dirty="0"/>
+              <a:t>TechBash Developer Conference - Poconos</a:t>
             </a:r>
           </a:p>
           <a:p>
@@ -10971,7 +10973,7 @@
       </p:sp>
       <p:pic>
         <p:nvPicPr>
-          <p:cNvPr id="3" name="Content Placeholder 10" descr="A screenshot of a computer&#10;&#10;Description automatically generated">
+          <p:cNvPr id="3" name="Content Placeholder 10">
             <a:extLst>
               <a:ext uri="{FF2B5EF4-FFF2-40B4-BE49-F238E27FC236}">
                 <a16:creationId xmlns:a16="http://schemas.microsoft.com/office/drawing/2014/main" id="{0BFDB4EE-B787-483E-CB90-91353A7A277B}"/>
@@ -10984,15 +10986,20 @@
           <p:nvPr/>
         </p:nvPicPr>
         <p:blipFill>
-          <a:blip r:embed="rId3"/>
-          <a:stretch>
-            <a:fillRect/>
-          </a:stretch>
+          <a:blip r:embed="rId3">
+            <a:extLst>
+              <a:ext uri="{28A0092B-C50C-407E-A947-70E740481C1C}">
+                <a14:useLocalDpi xmlns:a14="http://schemas.microsoft.com/office/drawing/2010/main" val="0"/>
+              </a:ext>
+            </a:extLst>
+          </a:blip>
+          <a:srcRect/>
+          <a:stretch/>
         </p:blipFill>
         <p:spPr>
           <a:xfrm>
-            <a:off x="195550" y="1193163"/>
-            <a:ext cx="3123947" cy="1461536"/>
+            <a:off x="270383" y="1193163"/>
+            <a:ext cx="2547650" cy="1724698"/>
           </a:xfrm>
           <a:prstGeom prst="rect">
             <a:avLst/>
@@ -11021,7 +11028,7 @@
         </p:blipFill>
         <p:spPr>
           <a:xfrm>
-            <a:off x="228602" y="2975983"/>
+            <a:off x="270383" y="3222283"/>
             <a:ext cx="2743200" cy="1591427"/>
           </a:xfrm>
           <a:prstGeom prst="rect">
@@ -11137,7 +11144,7 @@
         </p:blipFill>
         <p:spPr>
           <a:xfrm>
-            <a:off x="3755444" y="1185151"/>
+            <a:off x="3287567" y="1200181"/>
             <a:ext cx="2906753" cy="1729873"/>
           </a:xfrm>
           <a:prstGeom prst="rect">
@@ -11267,7 +11274,7 @@
           <a:p>
             <a:r>
               <a:rPr lang="en-US" dirty="0"/>
-              <a:t>Active* Development (Accessibility, High DPI, Performance, Dark Mode?)</a:t>
+              <a:t>Active Development (Accessibility, High DPI, Performance, Dark Mode?)</a:t>
             </a:r>
           </a:p>
           <a:p>
@@ -11403,7 +11410,7 @@
             <a:pPr lvl="1"/>
             <a:r>
               <a:rPr lang="en-US" dirty="0"/>
-              <a:t>Looks like Windows XP</a:t>
+              <a:t>Looks like Windows XP or 7</a:t>
             </a:r>
           </a:p>
           <a:p>

</xml_diff>